<commit_message>
Updates 21st Jan 2019
</commit_message>
<xml_diff>
--- a/Session 3/Shiny workshop - session 3.pptx
+++ b/Session 3/Shiny workshop - session 3.pptx
@@ -5,10 +5,10 @@
     <p:sldMasterId id="2147483648" r:id="rId4"/>
   </p:sldMasterIdLst>
   <p:notesMasterIdLst>
-    <p:notesMasterId r:id="rId36"/>
+    <p:notesMasterId r:id="rId42"/>
   </p:notesMasterIdLst>
   <p:handoutMasterIdLst>
-    <p:handoutMasterId r:id="rId37"/>
+    <p:handoutMasterId r:id="rId43"/>
   </p:handoutMasterIdLst>
   <p:sldIdLst>
     <p:sldId id="256" r:id="rId5"/>
@@ -38,10 +38,16 @@
     <p:sldId id="294" r:id="rId29"/>
     <p:sldId id="306" r:id="rId30"/>
     <p:sldId id="318" r:id="rId31"/>
-    <p:sldId id="320" r:id="rId32"/>
-    <p:sldId id="322" r:id="rId33"/>
-    <p:sldId id="269" r:id="rId34"/>
-    <p:sldId id="321" r:id="rId35"/>
+    <p:sldId id="321" r:id="rId32"/>
+    <p:sldId id="320" r:id="rId33"/>
+    <p:sldId id="322" r:id="rId34"/>
+    <p:sldId id="335" r:id="rId35"/>
+    <p:sldId id="336" r:id="rId36"/>
+    <p:sldId id="331" r:id="rId37"/>
+    <p:sldId id="334" r:id="rId38"/>
+    <p:sldId id="332" r:id="rId39"/>
+    <p:sldId id="333" r:id="rId40"/>
+    <p:sldId id="269" r:id="rId41"/>
   </p:sldIdLst>
   <p:sldSz cx="12192000" cy="6858000"/>
   <p:notesSz cx="6858000" cy="9144000"/>
@@ -245,7 +251,7 @@
           <a:p>
             <a:fld id="{EC34C92B-6A45-864A-B429-22A9039765DA}" type="datetimeFigureOut">
               <a:rPr lang="en-US" smtClean="0"/>
-              <a:t>17-Jan-19</a:t>
+              <a:t>21-Jan-19</a:t>
             </a:fld>
             <a:endParaRPr lang="en-US" dirty="0"/>
           </a:p>
@@ -422,7 +428,7 @@
           <a:p>
             <a:fld id="{0D265FE6-BEE9-465E-9202-2D200EDE749C}" type="datetimeFigureOut">
               <a:rPr lang="en-GB" smtClean="0"/>
-              <a:t>17/01/2019</a:t>
+              <a:t>21/01/2019</a:t>
             </a:fld>
             <a:endParaRPr lang="en-GB" dirty="0"/>
           </a:p>
@@ -1330,7 +1336,7 @@
           <a:p>
             <a:fld id="{F6DE8F2A-B3D4-43F2-B39B-CD77F64A1950}" type="slidenum">
               <a:rPr lang="en-GB" smtClean="0"/>
-              <a:t>29</a:t>
+              <a:t>30</a:t>
             </a:fld>
             <a:endParaRPr lang="en-GB" dirty="0"/>
           </a:p>
@@ -15017,20 +15023,14 @@
               <a:buAutoNum type="arabicPeriod"/>
             </a:pPr>
             <a:r>
-              <a:rPr lang="en-US" dirty="0" smtClean="0"/>
-              <a:t>More advanced elements – </a:t>
-            </a:r>
-            <a:r>
-              <a:rPr lang="en-US" b="1" dirty="0" smtClean="0"/>
-              <a:t>17</a:t>
-            </a:r>
-            <a:r>
-              <a:rPr lang="en-US" b="1" baseline="30000" dirty="0" smtClean="0"/>
-              <a:t>th</a:t>
-            </a:r>
-            <a:r>
-              <a:rPr lang="en-US" b="1" dirty="0" smtClean="0"/>
-              <a:t> Jan</a:t>
+              <a:rPr lang="en-US" dirty="0">
+                <a:solidFill>
+                  <a:schemeClr val="bg1">
+                    <a:lumMod val="75000"/>
+                  </a:schemeClr>
+                </a:solidFill>
+              </a:rPr>
+              <a:t>More advanced elements – 17th Jan</a:t>
             </a:r>
           </a:p>
           <a:p>
@@ -15038,7 +15038,13 @@
               <a:buNone/>
             </a:pPr>
             <a:r>
-              <a:rPr lang="en-US" dirty="0" smtClean="0"/>
+              <a:rPr lang="en-US" sz="1600" dirty="0">
+                <a:solidFill>
+                  <a:schemeClr val="bg1">
+                    <a:lumMod val="75000"/>
+                  </a:schemeClr>
+                </a:solidFill>
+              </a:rPr>
               <a:t>– Layout, themes &amp; dashboards, formatting, mapping, plots and tables</a:t>
             </a:r>
           </a:p>
@@ -17390,6 +17396,144 @@
           <a:p>
             <a:r>
               <a:rPr lang="en-US" dirty="0" smtClean="0"/>
+              <a:t>Session 3</a:t>
+            </a:r>
+            <a:endParaRPr lang="en-US" dirty="0"/>
+          </a:p>
+        </p:txBody>
+      </p:sp>
+      <p:sp>
+        <p:nvSpPr>
+          <p:cNvPr id="3" name="Content Placeholder 2"/>
+          <p:cNvSpPr>
+            <a:spLocks noGrp="1"/>
+          </p:cNvSpPr>
+          <p:nvPr>
+            <p:ph idx="1"/>
+          </p:nvPr>
+        </p:nvSpPr>
+        <p:spPr/>
+        <p:txBody>
+          <a:bodyPr/>
+          <a:lstStyle/>
+          <a:p>
+            <a:r>
+              <a:rPr lang="en-US" dirty="0" smtClean="0"/>
+              <a:t>Outline</a:t>
+            </a:r>
+          </a:p>
+          <a:p>
+            <a:pPr lvl="1"/>
+            <a:r>
+              <a:rPr lang="en-US" dirty="0" err="1" smtClean="0"/>
+              <a:t>renderUI</a:t>
+            </a:r>
+            <a:r>
+              <a:rPr lang="en-US" dirty="0" smtClean="0"/>
+              <a:t> function, </a:t>
+            </a:r>
+            <a:r>
+              <a:rPr lang="en-US" dirty="0" err="1" smtClean="0"/>
+              <a:t>conditionalPanels</a:t>
+            </a:r>
+            <a:r>
+              <a:rPr lang="en-US" dirty="0" smtClean="0"/>
+              <a:t>, </a:t>
+            </a:r>
+            <a:endParaRPr lang="en-US" dirty="0" smtClean="0"/>
+          </a:p>
+          <a:p>
+            <a:pPr lvl="1"/>
+            <a:r>
+              <a:rPr lang="en-US" dirty="0" smtClean="0"/>
+              <a:t>Reactive filtering </a:t>
+            </a:r>
+            <a:endParaRPr lang="en-US" dirty="0"/>
+          </a:p>
+          <a:p>
+            <a:pPr lvl="1"/>
+            <a:r>
+              <a:rPr lang="en-US" dirty="0" smtClean="0"/>
+              <a:t>Additional </a:t>
+            </a:r>
+            <a:r>
+              <a:rPr lang="en-US" dirty="0" smtClean="0"/>
+              <a:t>resources </a:t>
+            </a:r>
+          </a:p>
+          <a:p>
+            <a:pPr lvl="1"/>
+            <a:r>
+              <a:rPr lang="en-US" dirty="0"/>
+              <a:t>App </a:t>
+            </a:r>
+            <a:r>
+              <a:rPr lang="en-US" dirty="0" smtClean="0"/>
+              <a:t>troubleshooting </a:t>
+            </a:r>
+            <a:r>
+              <a:rPr lang="en-US" dirty="0" smtClean="0"/>
+              <a:t>–BYOA (bring your own app)</a:t>
+            </a:r>
+            <a:endParaRPr lang="en-US" dirty="0" smtClean="0"/>
+          </a:p>
+          <a:p>
+            <a:pPr lvl="1"/>
+            <a:endParaRPr lang="en-US" dirty="0" smtClean="0"/>
+          </a:p>
+          <a:p>
+            <a:pPr lvl="1"/>
+            <a:endParaRPr lang="en-US" dirty="0"/>
+          </a:p>
+        </p:txBody>
+      </p:sp>
+    </p:spTree>
+    <p:extLst>
+      <p:ext uri="{BB962C8B-B14F-4D97-AF65-F5344CB8AC3E}">
+        <p14:creationId xmlns:p14="http://schemas.microsoft.com/office/powerpoint/2010/main" val="1484368376"/>
+      </p:ext>
+    </p:extLst>
+  </p:cSld>
+  <p:clrMapOvr>
+    <a:masterClrMapping/>
+  </p:clrMapOvr>
+</p:sld>
+</file>
+
+<file path=ppt/slides/slide29.xml><?xml version="1.0" encoding="utf-8"?>
+<p:sld xmlns:a="http://schemas.openxmlformats.org/drawingml/2006/main" xmlns:r="http://schemas.openxmlformats.org/officeDocument/2006/relationships" xmlns:p="http://schemas.openxmlformats.org/presentationml/2006/main">
+  <p:cSld>
+    <p:spTree>
+      <p:nvGrpSpPr>
+        <p:cNvPr id="1" name=""/>
+        <p:cNvGrpSpPr/>
+        <p:nvPr/>
+      </p:nvGrpSpPr>
+      <p:grpSpPr>
+        <a:xfrm>
+          <a:off x="0" y="0"/>
+          <a:ext cx="0" cy="0"/>
+          <a:chOff x="0" y="0"/>
+          <a:chExt cx="0" cy="0"/>
+        </a:xfrm>
+      </p:grpSpPr>
+      <p:sp>
+        <p:nvSpPr>
+          <p:cNvPr id="2" name="Title 1"/>
+          <p:cNvSpPr>
+            <a:spLocks noGrp="1"/>
+          </p:cNvSpPr>
+          <p:nvPr>
+            <p:ph type="title"/>
+          </p:nvPr>
+        </p:nvSpPr>
+        <p:spPr/>
+        <p:txBody>
+          <a:bodyPr/>
+          <a:lstStyle/>
+          <a:p>
+            <a:r>
+              <a:rPr lang="en-US" dirty="0" smtClean="0"/>
               <a:t>Tables - </a:t>
             </a:r>
             <a:r>
@@ -17582,908 +17726,6 @@
       </p:par>
     </p:tnLst>
   </p:timing>
-</p:sld>
-</file>
-
-<file path=ppt/slides/slide29.xml><?xml version="1.0" encoding="utf-8"?>
-<p:sld xmlns:a="http://schemas.openxmlformats.org/drawingml/2006/main" xmlns:r="http://schemas.openxmlformats.org/officeDocument/2006/relationships" xmlns:p="http://schemas.openxmlformats.org/presentationml/2006/main">
-  <p:cSld>
-    <p:spTree>
-      <p:nvGrpSpPr>
-        <p:cNvPr id="1" name=""/>
-        <p:cNvGrpSpPr/>
-        <p:nvPr/>
-      </p:nvGrpSpPr>
-      <p:grpSpPr>
-        <a:xfrm>
-          <a:off x="0" y="0"/>
-          <a:ext cx="0" cy="0"/>
-          <a:chOff x="0" y="0"/>
-          <a:chExt cx="0" cy="0"/>
-        </a:xfrm>
-      </p:grpSpPr>
-      <p:sp>
-        <p:nvSpPr>
-          <p:cNvPr id="7" name="Text Placeholder 6"/>
-          <p:cNvSpPr>
-            <a:spLocks noGrp="1"/>
-          </p:cNvSpPr>
-          <p:nvPr>
-            <p:ph type="body" sz="quarter" idx="14"/>
-          </p:nvPr>
-        </p:nvSpPr>
-        <p:spPr>
-          <a:xfrm>
-            <a:off x="542620" y="1226357"/>
-            <a:ext cx="4900386" cy="334508"/>
-          </a:xfrm>
-        </p:spPr>
-        <p:txBody>
-          <a:bodyPr/>
-          <a:lstStyle/>
-          <a:p>
-            <a:r>
-              <a:rPr lang="en-US" dirty="0"/>
-              <a:t>minimal </a:t>
-            </a:r>
-            <a:r>
-              <a:rPr lang="en-US" dirty="0" smtClean="0"/>
-              <a:t>example 1</a:t>
-            </a:r>
-            <a:endParaRPr lang="en-US" dirty="0"/>
-          </a:p>
-        </p:txBody>
-      </p:sp>
-      <p:sp>
-        <p:nvSpPr>
-          <p:cNvPr id="10" name="Text Placeholder 9"/>
-          <p:cNvSpPr>
-            <a:spLocks noGrp="1"/>
-          </p:cNvSpPr>
-          <p:nvPr>
-            <p:ph type="body" sz="quarter" idx="18"/>
-          </p:nvPr>
-        </p:nvSpPr>
-        <p:spPr>
-          <a:xfrm>
-            <a:off x="6533248" y="5574061"/>
-            <a:ext cx="4900386" cy="883020"/>
-          </a:xfrm>
-        </p:spPr>
-        <p:txBody>
-          <a:bodyPr/>
-          <a:lstStyle/>
-          <a:p>
-            <a:r>
-              <a:rPr lang="en-US" dirty="0"/>
-              <a:t>More complex </a:t>
-            </a:r>
-            <a:r>
-              <a:rPr lang="en-US" dirty="0" smtClean="0"/>
-              <a:t>example/ </a:t>
-            </a:r>
-            <a:r>
-              <a:rPr lang="en-US" dirty="0"/>
-              <a:t>demo of other functionalities</a:t>
-            </a:r>
-            <a:r>
-              <a:rPr lang="en-US" dirty="0" smtClean="0"/>
-              <a:t>:</a:t>
-            </a:r>
-            <a:endParaRPr lang="en-US" dirty="0"/>
-          </a:p>
-          <a:p>
-            <a:r>
-              <a:rPr lang="en-US" dirty="0">
-                <a:hlinkClick r:id="rId3"/>
-              </a:rPr>
-              <a:t>https://gallery.shinyapps.io/012-datatables/</a:t>
-            </a:r>
-            <a:r>
-              <a:rPr lang="en-US" dirty="0"/>
-              <a:t> </a:t>
-            </a:r>
-          </a:p>
-        </p:txBody>
-      </p:sp>
-      <p:sp>
-        <p:nvSpPr>
-          <p:cNvPr id="3" name="Title 2"/>
-          <p:cNvSpPr>
-            <a:spLocks noGrp="1"/>
-          </p:cNvSpPr>
-          <p:nvPr>
-            <p:ph type="title"/>
-          </p:nvPr>
-        </p:nvSpPr>
-        <p:spPr/>
-        <p:txBody>
-          <a:bodyPr/>
-          <a:lstStyle/>
-          <a:p>
-            <a:r>
-              <a:rPr lang="en-US" dirty="0" err="1" smtClean="0"/>
-              <a:t>DataTables</a:t>
-            </a:r>
-            <a:endParaRPr lang="en-US" dirty="0"/>
-          </a:p>
-        </p:txBody>
-      </p:sp>
-      <p:sp>
-        <p:nvSpPr>
-          <p:cNvPr id="5" name="Rectangle 1"/>
-          <p:cNvSpPr>
-            <a:spLocks noGrp="1" noChangeArrowheads="1"/>
-          </p:cNvSpPr>
-          <p:nvPr>
-            <p:ph idx="4294967295"/>
-          </p:nvPr>
-        </p:nvSpPr>
-        <p:spPr bwMode="auto">
-          <a:xfrm>
-            <a:off x="608522" y="1696076"/>
-            <a:ext cx="4991100" cy="3877985"/>
-          </a:xfrm>
-          <a:prstGeom prst="rect">
-            <a:avLst/>
-          </a:prstGeom>
-          <a:solidFill>
-            <a:schemeClr val="bg1"/>
-          </a:solidFill>
-          <a:ln>
-            <a:noFill/>
-          </a:ln>
-          <a:effectLst/>
-          <a:extLst/>
-        </p:spPr>
-        <p:txBody>
-          <a:bodyPr vert="horz" wrap="square" lIns="0" tIns="0" rIns="0" bIns="0" numCol="1" anchor="ctr" anchorCtr="0" compatLnSpc="1">
-            <a:prstTxWarp prst="textNoShape">
-              <a:avLst/>
-            </a:prstTxWarp>
-            <a:spAutoFit/>
-          </a:bodyPr>
-          <a:lstStyle/>
-          <a:p>
-            <a:pPr marL="0" marR="0" lvl="0" indent="0" algn="l" defTabSz="914400" rtl="0" eaLnBrk="0" fontAlgn="base" latinLnBrk="0" hangingPunct="0">
-              <a:lnSpc>
-                <a:spcPct val="100000"/>
-              </a:lnSpc>
-              <a:spcBef>
-                <a:spcPct val="0"/>
-              </a:spcBef>
-              <a:spcAft>
-                <a:spcPct val="0"/>
-              </a:spcAft>
-              <a:buClrTx/>
-              <a:buSzTx/>
-              <a:buFontTx/>
-              <a:buNone/>
-              <a:tabLst/>
-            </a:pPr>
-            <a:r>
-              <a:rPr kumimoji="0" lang="en-US" altLang="en-US" sz="1800" b="0" i="0" u="none" strike="noStrike" cap="none" normalizeH="0" baseline="0" dirty="0" smtClean="0">
-                <a:ln>
-                  <a:noFill/>
-                </a:ln>
-                <a:effectLst/>
-                <a:latin typeface="Arial" panose="020B0604020202020204" pitchFamily="34" charset="0"/>
-                <a:cs typeface="Arial" panose="020B0604020202020204" pitchFamily="34" charset="0"/>
-              </a:rPr>
-              <a:t>library(DT) </a:t>
-            </a:r>
-          </a:p>
-          <a:p>
-            <a:pPr marL="0" marR="0" lvl="0" indent="0" algn="l" defTabSz="914400" rtl="0" eaLnBrk="0" fontAlgn="base" latinLnBrk="0" hangingPunct="0">
-              <a:lnSpc>
-                <a:spcPct val="100000"/>
-              </a:lnSpc>
-              <a:spcBef>
-                <a:spcPct val="0"/>
-              </a:spcBef>
-              <a:spcAft>
-                <a:spcPct val="0"/>
-              </a:spcAft>
-              <a:buClrTx/>
-              <a:buSzTx/>
-              <a:buFontTx/>
-              <a:buNone/>
-              <a:tabLst/>
-            </a:pPr>
-            <a:endParaRPr kumimoji="0" lang="en-US" altLang="en-US" sz="1800" b="0" i="0" u="none" strike="noStrike" cap="none" normalizeH="0" baseline="0" dirty="0" smtClean="0">
-              <a:ln>
-                <a:noFill/>
-              </a:ln>
-              <a:effectLst/>
-              <a:latin typeface="Arial" panose="020B0604020202020204" pitchFamily="34" charset="0"/>
-              <a:cs typeface="Arial" panose="020B0604020202020204" pitchFamily="34" charset="0"/>
-            </a:endParaRPr>
-          </a:p>
-          <a:p>
-            <a:pPr marL="0" marR="0" lvl="0" indent="0" algn="l" defTabSz="914400" rtl="0" eaLnBrk="0" fontAlgn="base" latinLnBrk="0" hangingPunct="0">
-              <a:lnSpc>
-                <a:spcPct val="100000"/>
-              </a:lnSpc>
-              <a:spcBef>
-                <a:spcPct val="0"/>
-              </a:spcBef>
-              <a:spcAft>
-                <a:spcPct val="0"/>
-              </a:spcAft>
-              <a:buClrTx/>
-              <a:buSzTx/>
-              <a:buFontTx/>
-              <a:buNone/>
-              <a:tabLst/>
-            </a:pPr>
-            <a:r>
-              <a:rPr kumimoji="0" lang="en-US" altLang="en-US" sz="1800" b="0" i="0" u="none" strike="noStrike" cap="none" normalizeH="0" baseline="0" dirty="0" err="1" smtClean="0">
-                <a:ln>
-                  <a:noFill/>
-                </a:ln>
-                <a:effectLst/>
-                <a:latin typeface="Arial" panose="020B0604020202020204" pitchFamily="34" charset="0"/>
-                <a:cs typeface="Arial" panose="020B0604020202020204" pitchFamily="34" charset="0"/>
-              </a:rPr>
-              <a:t>ui</a:t>
-            </a:r>
-            <a:r>
-              <a:rPr kumimoji="0" lang="en-US" altLang="en-US" sz="1800" b="0" i="0" u="none" strike="noStrike" cap="none" normalizeH="0" baseline="0" dirty="0" smtClean="0">
-                <a:ln>
-                  <a:noFill/>
-                </a:ln>
-                <a:effectLst/>
-                <a:latin typeface="Arial" panose="020B0604020202020204" pitchFamily="34" charset="0"/>
-                <a:cs typeface="Arial" panose="020B0604020202020204" pitchFamily="34" charset="0"/>
-              </a:rPr>
-              <a:t> &lt;- </a:t>
-            </a:r>
-            <a:r>
-              <a:rPr kumimoji="0" lang="en-US" altLang="en-US" sz="1800" b="0" i="0" u="none" strike="noStrike" cap="none" normalizeH="0" baseline="0" dirty="0" err="1" smtClean="0">
-                <a:ln>
-                  <a:noFill/>
-                </a:ln>
-                <a:effectLst/>
-                <a:latin typeface="Arial" panose="020B0604020202020204" pitchFamily="34" charset="0"/>
-                <a:cs typeface="Arial" panose="020B0604020202020204" pitchFamily="34" charset="0"/>
-              </a:rPr>
-              <a:t>fluidPage</a:t>
-            </a:r>
-            <a:r>
-              <a:rPr kumimoji="0" lang="en-US" altLang="en-US" sz="1800" b="0" i="0" u="none" strike="noStrike" cap="none" normalizeH="0" baseline="0" dirty="0" smtClean="0">
-                <a:ln>
-                  <a:noFill/>
-                </a:ln>
-                <a:effectLst/>
-                <a:latin typeface="Arial" panose="020B0604020202020204" pitchFamily="34" charset="0"/>
-                <a:cs typeface="Arial" panose="020B0604020202020204" pitchFamily="34" charset="0"/>
-              </a:rPr>
-              <a:t>( </a:t>
-            </a:r>
-          </a:p>
-          <a:p>
-            <a:pPr marL="0" marR="0" lvl="0" indent="0" algn="l" defTabSz="914400" rtl="0" eaLnBrk="0" fontAlgn="base" latinLnBrk="0" hangingPunct="0">
-              <a:lnSpc>
-                <a:spcPct val="100000"/>
-              </a:lnSpc>
-              <a:spcBef>
-                <a:spcPct val="0"/>
-              </a:spcBef>
-              <a:spcAft>
-                <a:spcPct val="0"/>
-              </a:spcAft>
-              <a:buClrTx/>
-              <a:buSzTx/>
-              <a:buFontTx/>
-              <a:buNone/>
-              <a:tabLst/>
-            </a:pPr>
-            <a:r>
-              <a:rPr lang="en-US" altLang="en-US" sz="1800" dirty="0" smtClean="0">
-                <a:latin typeface="Arial" panose="020B0604020202020204" pitchFamily="34" charset="0"/>
-                <a:cs typeface="Arial" panose="020B0604020202020204" pitchFamily="34" charset="0"/>
-              </a:rPr>
-              <a:t>     </a:t>
-            </a:r>
-            <a:r>
-              <a:rPr kumimoji="0" lang="en-US" altLang="en-US" sz="1800" b="0" i="0" u="none" strike="noStrike" cap="none" normalizeH="0" baseline="0" dirty="0" smtClean="0">
-                <a:ln>
-                  <a:noFill/>
-                </a:ln>
-                <a:effectLst/>
-                <a:latin typeface="Arial" panose="020B0604020202020204" pitchFamily="34" charset="0"/>
-                <a:cs typeface="Arial" panose="020B0604020202020204" pitchFamily="34" charset="0"/>
-              </a:rPr>
-              <a:t>h2("The </a:t>
-            </a:r>
-            <a:r>
-              <a:rPr kumimoji="0" lang="en-US" altLang="en-US" sz="1800" b="0" i="0" u="none" strike="noStrike" cap="none" normalizeH="0" baseline="0" dirty="0" err="1" smtClean="0">
-                <a:ln>
-                  <a:noFill/>
-                </a:ln>
-                <a:effectLst/>
-                <a:latin typeface="Arial" panose="020B0604020202020204" pitchFamily="34" charset="0"/>
-                <a:cs typeface="Arial" panose="020B0604020202020204" pitchFamily="34" charset="0"/>
-              </a:rPr>
-              <a:t>mtcars</a:t>
-            </a:r>
-            <a:r>
-              <a:rPr kumimoji="0" lang="en-US" altLang="en-US" sz="1800" b="0" i="0" u="none" strike="noStrike" cap="none" normalizeH="0" baseline="0" dirty="0" smtClean="0">
-                <a:ln>
-                  <a:noFill/>
-                </a:ln>
-                <a:effectLst/>
-                <a:latin typeface="Arial" panose="020B0604020202020204" pitchFamily="34" charset="0"/>
-                <a:cs typeface="Arial" panose="020B0604020202020204" pitchFamily="34" charset="0"/>
-              </a:rPr>
-              <a:t> data"), </a:t>
-            </a:r>
-          </a:p>
-          <a:p>
-            <a:pPr marL="0" marR="0" lvl="0" indent="0" algn="l" defTabSz="914400" rtl="0" eaLnBrk="0" fontAlgn="base" latinLnBrk="0" hangingPunct="0">
-              <a:lnSpc>
-                <a:spcPct val="100000"/>
-              </a:lnSpc>
-              <a:spcBef>
-                <a:spcPct val="0"/>
-              </a:spcBef>
-              <a:spcAft>
-                <a:spcPct val="0"/>
-              </a:spcAft>
-              <a:buClrTx/>
-              <a:buSzTx/>
-              <a:buFontTx/>
-              <a:buNone/>
-              <a:tabLst/>
-            </a:pPr>
-            <a:r>
-              <a:rPr lang="en-US" altLang="en-US" sz="1800" dirty="0">
-                <a:latin typeface="Arial" panose="020B0604020202020204" pitchFamily="34" charset="0"/>
-                <a:cs typeface="Arial" panose="020B0604020202020204" pitchFamily="34" charset="0"/>
-              </a:rPr>
-              <a:t> </a:t>
-            </a:r>
-            <a:r>
-              <a:rPr lang="en-US" altLang="en-US" sz="1800" dirty="0" smtClean="0">
-                <a:latin typeface="Arial" panose="020B0604020202020204" pitchFamily="34" charset="0"/>
-                <a:cs typeface="Arial" panose="020B0604020202020204" pitchFamily="34" charset="0"/>
-              </a:rPr>
-              <a:t>    </a:t>
-            </a:r>
-            <a:r>
-              <a:rPr kumimoji="0" lang="en-US" altLang="en-US" sz="1800" b="0" i="0" u="none" strike="noStrike" cap="none" normalizeH="0" baseline="0" dirty="0" smtClean="0">
-                <a:ln>
-                  <a:noFill/>
-                </a:ln>
-                <a:effectLst/>
-                <a:latin typeface="Arial" panose="020B0604020202020204" pitchFamily="34" charset="0"/>
-                <a:cs typeface="Arial" panose="020B0604020202020204" pitchFamily="34" charset="0"/>
-              </a:rPr>
-              <a:t>DT::</a:t>
-            </a:r>
-            <a:r>
-              <a:rPr kumimoji="0" lang="en-US" altLang="en-US" sz="1800" b="0" i="0" u="none" strike="noStrike" cap="none" normalizeH="0" baseline="0" dirty="0" err="1" smtClean="0">
-                <a:ln>
-                  <a:noFill/>
-                </a:ln>
-                <a:effectLst/>
-                <a:latin typeface="Arial" panose="020B0604020202020204" pitchFamily="34" charset="0"/>
-                <a:cs typeface="Arial" panose="020B0604020202020204" pitchFamily="34" charset="0"/>
-              </a:rPr>
-              <a:t>dataTableOutput</a:t>
-            </a:r>
-            <a:r>
-              <a:rPr kumimoji="0" lang="en-US" altLang="en-US" sz="1800" b="0" i="0" u="none" strike="noStrike" cap="none" normalizeH="0" baseline="0" dirty="0" smtClean="0">
-                <a:ln>
-                  <a:noFill/>
-                </a:ln>
-                <a:effectLst/>
-                <a:latin typeface="Arial" panose="020B0604020202020204" pitchFamily="34" charset="0"/>
-                <a:cs typeface="Arial" panose="020B0604020202020204" pitchFamily="34" charset="0"/>
-              </a:rPr>
-              <a:t>("</a:t>
-            </a:r>
-            <a:r>
-              <a:rPr kumimoji="0" lang="en-US" altLang="en-US" sz="1800" b="0" i="0" u="none" strike="noStrike" cap="none" normalizeH="0" baseline="0" dirty="0" err="1" smtClean="0">
-                <a:ln>
-                  <a:noFill/>
-                </a:ln>
-                <a:effectLst/>
-                <a:latin typeface="Arial" panose="020B0604020202020204" pitchFamily="34" charset="0"/>
-                <a:cs typeface="Arial" panose="020B0604020202020204" pitchFamily="34" charset="0"/>
-              </a:rPr>
-              <a:t>mytable</a:t>
-            </a:r>
-            <a:r>
-              <a:rPr kumimoji="0" lang="en-US" altLang="en-US" sz="1800" b="0" i="0" u="none" strike="noStrike" cap="none" normalizeH="0" baseline="0" dirty="0" smtClean="0">
-                <a:ln>
-                  <a:noFill/>
-                </a:ln>
-                <a:effectLst/>
-                <a:latin typeface="Arial" panose="020B0604020202020204" pitchFamily="34" charset="0"/>
-                <a:cs typeface="Arial" panose="020B0604020202020204" pitchFamily="34" charset="0"/>
-              </a:rPr>
-              <a:t>")</a:t>
-            </a:r>
-          </a:p>
-          <a:p>
-            <a:pPr marL="0" marR="0" lvl="0" indent="0" algn="l" defTabSz="914400" rtl="0" eaLnBrk="0" fontAlgn="base" latinLnBrk="0" hangingPunct="0">
-              <a:lnSpc>
-                <a:spcPct val="100000"/>
-              </a:lnSpc>
-              <a:spcBef>
-                <a:spcPct val="0"/>
-              </a:spcBef>
-              <a:spcAft>
-                <a:spcPct val="0"/>
-              </a:spcAft>
-              <a:buClrTx/>
-              <a:buSzTx/>
-              <a:buFontTx/>
-              <a:buNone/>
-              <a:tabLst/>
-            </a:pPr>
-            <a:r>
-              <a:rPr kumimoji="0" lang="en-US" altLang="en-US" sz="1800" b="0" i="0" u="none" strike="noStrike" cap="none" normalizeH="0" baseline="0" dirty="0" smtClean="0">
-                <a:ln>
-                  <a:noFill/>
-                </a:ln>
-                <a:effectLst/>
-                <a:latin typeface="Arial" panose="020B0604020202020204" pitchFamily="34" charset="0"/>
-                <a:cs typeface="Arial" panose="020B0604020202020204" pitchFamily="34" charset="0"/>
-              </a:rPr>
-              <a:t> )</a:t>
-            </a:r>
-          </a:p>
-          <a:p>
-            <a:pPr marL="0" marR="0" lvl="0" indent="0" algn="l" defTabSz="914400" rtl="0" eaLnBrk="0" fontAlgn="base" latinLnBrk="0" hangingPunct="0">
-              <a:lnSpc>
-                <a:spcPct val="100000"/>
-              </a:lnSpc>
-              <a:spcBef>
-                <a:spcPct val="0"/>
-              </a:spcBef>
-              <a:spcAft>
-                <a:spcPct val="0"/>
-              </a:spcAft>
-              <a:buClrTx/>
-              <a:buSzTx/>
-              <a:buFontTx/>
-              <a:buNone/>
-              <a:tabLst/>
-            </a:pPr>
-            <a:endParaRPr lang="en-US" altLang="en-US" sz="1800" dirty="0">
-              <a:latin typeface="Arial" panose="020B0604020202020204" pitchFamily="34" charset="0"/>
-              <a:cs typeface="Arial" panose="020B0604020202020204" pitchFamily="34" charset="0"/>
-            </a:endParaRPr>
-          </a:p>
-          <a:p>
-            <a:pPr marL="0" marR="0" lvl="0" indent="0" algn="l" defTabSz="914400" rtl="0" eaLnBrk="0" fontAlgn="base" latinLnBrk="0" hangingPunct="0">
-              <a:lnSpc>
-                <a:spcPct val="100000"/>
-              </a:lnSpc>
-              <a:spcBef>
-                <a:spcPct val="0"/>
-              </a:spcBef>
-              <a:spcAft>
-                <a:spcPct val="0"/>
-              </a:spcAft>
-              <a:buClrTx/>
-              <a:buSzTx/>
-              <a:buFontTx/>
-              <a:buNone/>
-              <a:tabLst/>
-            </a:pPr>
-            <a:r>
-              <a:rPr kumimoji="0" lang="en-US" altLang="en-US" sz="1800" b="0" i="0" u="none" strike="noStrike" cap="none" normalizeH="0" baseline="0" dirty="0" smtClean="0">
-                <a:ln>
-                  <a:noFill/>
-                </a:ln>
-                <a:effectLst/>
-                <a:latin typeface="Arial" panose="020B0604020202020204" pitchFamily="34" charset="0"/>
-                <a:cs typeface="Arial" panose="020B0604020202020204" pitchFamily="34" charset="0"/>
-              </a:rPr>
-              <a:t> server &lt;- function(input, output) { </a:t>
-            </a:r>
-          </a:p>
-          <a:p>
-            <a:pPr marL="0" marR="0" lvl="0" indent="0" algn="l" defTabSz="914400" rtl="0" eaLnBrk="0" fontAlgn="base" latinLnBrk="0" hangingPunct="0">
-              <a:lnSpc>
-                <a:spcPct val="100000"/>
-              </a:lnSpc>
-              <a:spcBef>
-                <a:spcPct val="0"/>
-              </a:spcBef>
-              <a:spcAft>
-                <a:spcPct val="0"/>
-              </a:spcAft>
-              <a:buClrTx/>
-              <a:buSzTx/>
-              <a:buFontTx/>
-              <a:buNone/>
-              <a:tabLst/>
-            </a:pPr>
-            <a:r>
-              <a:rPr lang="en-US" altLang="en-US" sz="1800" dirty="0">
-                <a:latin typeface="Arial" panose="020B0604020202020204" pitchFamily="34" charset="0"/>
-                <a:cs typeface="Arial" panose="020B0604020202020204" pitchFamily="34" charset="0"/>
-              </a:rPr>
-              <a:t> </a:t>
-            </a:r>
-            <a:r>
-              <a:rPr lang="en-US" altLang="en-US" sz="1800" dirty="0" smtClean="0">
-                <a:latin typeface="Arial" panose="020B0604020202020204" pitchFamily="34" charset="0"/>
-                <a:cs typeface="Arial" panose="020B0604020202020204" pitchFamily="34" charset="0"/>
-              </a:rPr>
-              <a:t>   </a:t>
-            </a:r>
-            <a:r>
-              <a:rPr kumimoji="0" lang="en-US" altLang="en-US" sz="1800" b="0" i="0" u="none" strike="noStrike" cap="none" normalizeH="0" baseline="0" dirty="0" err="1" smtClean="0">
-                <a:ln>
-                  <a:noFill/>
-                </a:ln>
-                <a:effectLst/>
-                <a:latin typeface="Arial" panose="020B0604020202020204" pitchFamily="34" charset="0"/>
-                <a:cs typeface="Arial" panose="020B0604020202020204" pitchFamily="34" charset="0"/>
-              </a:rPr>
-              <a:t>output$mytable</a:t>
-            </a:r>
-            <a:r>
-              <a:rPr kumimoji="0" lang="en-US" altLang="en-US" sz="1800" b="0" i="0" u="none" strike="noStrike" cap="none" normalizeH="0" baseline="0" dirty="0" smtClean="0">
-                <a:ln>
-                  <a:noFill/>
-                </a:ln>
-                <a:effectLst/>
-                <a:latin typeface="Arial" panose="020B0604020202020204" pitchFamily="34" charset="0"/>
-                <a:cs typeface="Arial" panose="020B0604020202020204" pitchFamily="34" charset="0"/>
-              </a:rPr>
-              <a:t> </a:t>
-            </a:r>
-            <a:r>
-              <a:rPr lang="en-US" altLang="en-US" sz="1800" dirty="0" smtClean="0">
-                <a:latin typeface="Arial" panose="020B0604020202020204" pitchFamily="34" charset="0"/>
-                <a:cs typeface="Arial" panose="020B0604020202020204" pitchFamily="34" charset="0"/>
-              </a:rPr>
-              <a:t>&lt;-</a:t>
-            </a:r>
-            <a:r>
-              <a:rPr kumimoji="0" lang="en-US" altLang="en-US" sz="1800" b="0" i="0" u="none" strike="noStrike" cap="none" normalizeH="0" baseline="0" dirty="0" smtClean="0">
-                <a:ln>
-                  <a:noFill/>
-                </a:ln>
-                <a:effectLst/>
-                <a:latin typeface="Arial" panose="020B0604020202020204" pitchFamily="34" charset="0"/>
-                <a:cs typeface="Arial" panose="020B0604020202020204" pitchFamily="34" charset="0"/>
-              </a:rPr>
-              <a:t> DT::</a:t>
-            </a:r>
-            <a:r>
-              <a:rPr kumimoji="0" lang="en-US" altLang="en-US" sz="1800" b="0" i="0" u="none" strike="noStrike" cap="none" normalizeH="0" baseline="0" dirty="0" err="1" smtClean="0">
-                <a:ln>
-                  <a:noFill/>
-                </a:ln>
-                <a:effectLst/>
-                <a:latin typeface="Arial" panose="020B0604020202020204" pitchFamily="34" charset="0"/>
-                <a:cs typeface="Arial" panose="020B0604020202020204" pitchFamily="34" charset="0"/>
-              </a:rPr>
-              <a:t>renderDataTable</a:t>
-            </a:r>
-            <a:r>
-              <a:rPr kumimoji="0" lang="en-US" altLang="en-US" sz="1800" b="0" i="0" u="none" strike="noStrike" cap="none" normalizeH="0" baseline="0" dirty="0" smtClean="0">
-                <a:ln>
-                  <a:noFill/>
-                </a:ln>
-                <a:effectLst/>
-                <a:latin typeface="Arial" panose="020B0604020202020204" pitchFamily="34" charset="0"/>
-                <a:cs typeface="Arial" panose="020B0604020202020204" pitchFamily="34" charset="0"/>
-              </a:rPr>
-              <a:t>({</a:t>
-            </a:r>
-          </a:p>
-          <a:p>
-            <a:pPr marL="0" marR="0" lvl="0" indent="0" algn="l" defTabSz="914400" rtl="0" eaLnBrk="0" fontAlgn="base" latinLnBrk="0" hangingPunct="0">
-              <a:lnSpc>
-                <a:spcPct val="100000"/>
-              </a:lnSpc>
-              <a:spcBef>
-                <a:spcPct val="0"/>
-              </a:spcBef>
-              <a:spcAft>
-                <a:spcPct val="0"/>
-              </a:spcAft>
-              <a:buClrTx/>
-              <a:buSzTx/>
-              <a:buFontTx/>
-              <a:buNone/>
-              <a:tabLst/>
-            </a:pPr>
-            <a:r>
-              <a:rPr kumimoji="0" lang="en-US" altLang="en-US" sz="1800" b="0" i="0" u="none" strike="noStrike" cap="none" normalizeH="0" baseline="0" dirty="0" err="1" smtClean="0">
-                <a:ln>
-                  <a:noFill/>
-                </a:ln>
-                <a:effectLst/>
-                <a:latin typeface="Arial" panose="020B0604020202020204" pitchFamily="34" charset="0"/>
-                <a:cs typeface="Arial" panose="020B0604020202020204" pitchFamily="34" charset="0"/>
-              </a:rPr>
-              <a:t>mtcars</a:t>
-            </a:r>
-            <a:r>
-              <a:rPr kumimoji="0" lang="en-US" altLang="en-US" sz="1800" b="0" i="0" u="none" strike="noStrike" cap="none" normalizeH="0" baseline="0" dirty="0" smtClean="0">
-                <a:ln>
-                  <a:noFill/>
-                </a:ln>
-                <a:effectLst/>
-                <a:latin typeface="Arial" panose="020B0604020202020204" pitchFamily="34" charset="0"/>
-                <a:cs typeface="Arial" panose="020B0604020202020204" pitchFamily="34" charset="0"/>
-              </a:rPr>
-              <a:t> </a:t>
-            </a:r>
-          </a:p>
-          <a:p>
-            <a:pPr marL="0" marR="0" lvl="0" indent="0" algn="l" defTabSz="914400" rtl="0" eaLnBrk="0" fontAlgn="base" latinLnBrk="0" hangingPunct="0">
-              <a:lnSpc>
-                <a:spcPct val="100000"/>
-              </a:lnSpc>
-              <a:spcBef>
-                <a:spcPct val="0"/>
-              </a:spcBef>
-              <a:spcAft>
-                <a:spcPct val="0"/>
-              </a:spcAft>
-              <a:buClrTx/>
-              <a:buSzTx/>
-              <a:buFontTx/>
-              <a:buNone/>
-              <a:tabLst/>
-            </a:pPr>
-            <a:r>
-              <a:rPr lang="en-US" altLang="en-US" sz="1800" dirty="0">
-                <a:latin typeface="Arial" panose="020B0604020202020204" pitchFamily="34" charset="0"/>
-                <a:cs typeface="Arial" panose="020B0604020202020204" pitchFamily="34" charset="0"/>
-              </a:rPr>
-              <a:t> </a:t>
-            </a:r>
-            <a:r>
-              <a:rPr lang="en-US" altLang="en-US" sz="1800" dirty="0" smtClean="0">
-                <a:latin typeface="Arial" panose="020B0604020202020204" pitchFamily="34" charset="0"/>
-                <a:cs typeface="Arial" panose="020B0604020202020204" pitchFamily="34" charset="0"/>
-              </a:rPr>
-              <a:t> </a:t>
-            </a:r>
-            <a:r>
-              <a:rPr kumimoji="0" lang="en-US" altLang="en-US" sz="1800" b="0" i="0" u="none" strike="noStrike" cap="none" normalizeH="0" baseline="0" dirty="0" smtClean="0">
-                <a:ln>
-                  <a:noFill/>
-                </a:ln>
-                <a:effectLst/>
-                <a:latin typeface="Arial" panose="020B0604020202020204" pitchFamily="34" charset="0"/>
-                <a:cs typeface="Arial" panose="020B0604020202020204" pitchFamily="34" charset="0"/>
-              </a:rPr>
-              <a:t>})</a:t>
-            </a:r>
-          </a:p>
-          <a:p>
-            <a:pPr marL="0" marR="0" lvl="0" indent="0" algn="l" defTabSz="914400" rtl="0" eaLnBrk="0" fontAlgn="base" latinLnBrk="0" hangingPunct="0">
-              <a:lnSpc>
-                <a:spcPct val="100000"/>
-              </a:lnSpc>
-              <a:spcBef>
-                <a:spcPct val="0"/>
-              </a:spcBef>
-              <a:spcAft>
-                <a:spcPct val="0"/>
-              </a:spcAft>
-              <a:buClrTx/>
-              <a:buSzTx/>
-              <a:buFontTx/>
-              <a:buNone/>
-              <a:tabLst/>
-            </a:pPr>
-            <a:r>
-              <a:rPr kumimoji="0" lang="en-US" altLang="en-US" sz="1800" b="0" i="0" u="none" strike="noStrike" cap="none" normalizeH="0" baseline="0" dirty="0" smtClean="0">
-                <a:ln>
-                  <a:noFill/>
-                </a:ln>
-                <a:effectLst/>
-                <a:latin typeface="Arial" panose="020B0604020202020204" pitchFamily="34" charset="0"/>
-                <a:cs typeface="Arial" panose="020B0604020202020204" pitchFamily="34" charset="0"/>
-              </a:rPr>
-              <a:t> }</a:t>
-            </a:r>
-          </a:p>
-          <a:p>
-            <a:pPr marL="0" marR="0" lvl="0" indent="0" algn="l" defTabSz="914400" rtl="0" eaLnBrk="0" fontAlgn="base" latinLnBrk="0" hangingPunct="0">
-              <a:lnSpc>
-                <a:spcPct val="100000"/>
-              </a:lnSpc>
-              <a:spcBef>
-                <a:spcPct val="0"/>
-              </a:spcBef>
-              <a:spcAft>
-                <a:spcPct val="0"/>
-              </a:spcAft>
-              <a:buClrTx/>
-              <a:buSzTx/>
-              <a:buFontTx/>
-              <a:buNone/>
-              <a:tabLst/>
-            </a:pPr>
-            <a:endParaRPr lang="en-US" altLang="en-US" sz="1800" dirty="0">
-              <a:latin typeface="Arial" panose="020B0604020202020204" pitchFamily="34" charset="0"/>
-              <a:cs typeface="Arial" panose="020B0604020202020204" pitchFamily="34" charset="0"/>
-            </a:endParaRPr>
-          </a:p>
-          <a:p>
-            <a:pPr marL="0" marR="0" lvl="0" indent="0" algn="l" defTabSz="914400" rtl="0" eaLnBrk="0" fontAlgn="base" latinLnBrk="0" hangingPunct="0">
-              <a:lnSpc>
-                <a:spcPct val="100000"/>
-              </a:lnSpc>
-              <a:spcBef>
-                <a:spcPct val="0"/>
-              </a:spcBef>
-              <a:spcAft>
-                <a:spcPct val="0"/>
-              </a:spcAft>
-              <a:buClrTx/>
-              <a:buSzTx/>
-              <a:buFontTx/>
-              <a:buNone/>
-              <a:tabLst/>
-            </a:pPr>
-            <a:r>
-              <a:rPr kumimoji="0" lang="en-US" altLang="en-US" sz="1800" b="0" i="0" u="none" strike="noStrike" cap="none" normalizeH="0" baseline="0" dirty="0" smtClean="0">
-                <a:ln>
-                  <a:noFill/>
-                </a:ln>
-                <a:effectLst/>
-                <a:latin typeface="Arial" panose="020B0604020202020204" pitchFamily="34" charset="0"/>
-                <a:cs typeface="Arial" panose="020B0604020202020204" pitchFamily="34" charset="0"/>
-              </a:rPr>
-              <a:t> </a:t>
-            </a:r>
-            <a:r>
-              <a:rPr kumimoji="0" lang="en-US" altLang="en-US" sz="1800" b="0" i="0" u="none" strike="noStrike" cap="none" normalizeH="0" baseline="0" dirty="0" err="1" smtClean="0">
-                <a:ln>
-                  <a:noFill/>
-                </a:ln>
-                <a:effectLst/>
-                <a:latin typeface="Arial" panose="020B0604020202020204" pitchFamily="34" charset="0"/>
-                <a:cs typeface="Arial" panose="020B0604020202020204" pitchFamily="34" charset="0"/>
-              </a:rPr>
-              <a:t>shinyApp</a:t>
-            </a:r>
-            <a:r>
-              <a:rPr kumimoji="0" lang="en-US" altLang="en-US" sz="1800" b="0" i="0" u="none" strike="noStrike" cap="none" normalizeH="0" baseline="0" dirty="0" smtClean="0">
-                <a:ln>
-                  <a:noFill/>
-                </a:ln>
-                <a:effectLst/>
-                <a:latin typeface="Arial" panose="020B0604020202020204" pitchFamily="34" charset="0"/>
-                <a:cs typeface="Arial" panose="020B0604020202020204" pitchFamily="34" charset="0"/>
-              </a:rPr>
-              <a:t>(</a:t>
-            </a:r>
-            <a:r>
-              <a:rPr kumimoji="0" lang="en-US" altLang="en-US" sz="1800" b="0" i="0" u="none" strike="noStrike" cap="none" normalizeH="0" baseline="0" dirty="0" err="1" smtClean="0">
-                <a:ln>
-                  <a:noFill/>
-                </a:ln>
-                <a:effectLst/>
-                <a:latin typeface="Arial" panose="020B0604020202020204" pitchFamily="34" charset="0"/>
-                <a:cs typeface="Arial" panose="020B0604020202020204" pitchFamily="34" charset="0"/>
-              </a:rPr>
-              <a:t>ui</a:t>
-            </a:r>
-            <a:r>
-              <a:rPr kumimoji="0" lang="en-US" altLang="en-US" sz="1800" b="0" i="0" u="none" strike="noStrike" cap="none" normalizeH="0" baseline="0" dirty="0" smtClean="0">
-                <a:ln>
-                  <a:noFill/>
-                </a:ln>
-                <a:effectLst/>
-                <a:latin typeface="Arial" panose="020B0604020202020204" pitchFamily="34" charset="0"/>
-                <a:cs typeface="Arial" panose="020B0604020202020204" pitchFamily="34" charset="0"/>
-              </a:rPr>
-              <a:t>, server) </a:t>
-            </a:r>
-          </a:p>
-        </p:txBody>
-      </p:sp>
-      <p:pic>
-        <p:nvPicPr>
-          <p:cNvPr id="4" name="Picture 3"/>
-          <p:cNvPicPr>
-            <a:picLocks noChangeAspect="1"/>
-          </p:cNvPicPr>
-          <p:nvPr/>
-        </p:nvPicPr>
-        <p:blipFill>
-          <a:blip r:embed="rId4"/>
-          <a:stretch>
-            <a:fillRect/>
-          </a:stretch>
-        </p:blipFill>
-        <p:spPr>
-          <a:xfrm>
-            <a:off x="7090460" y="3077802"/>
-            <a:ext cx="3952875" cy="2257425"/>
-          </a:xfrm>
-          <a:prstGeom prst="rect">
-            <a:avLst/>
-          </a:prstGeom>
-        </p:spPr>
-      </p:pic>
-      <p:pic>
-        <p:nvPicPr>
-          <p:cNvPr id="6" name="Picture 5"/>
-          <p:cNvPicPr>
-            <a:picLocks noChangeAspect="1"/>
-          </p:cNvPicPr>
-          <p:nvPr/>
-        </p:nvPicPr>
-        <p:blipFill rotWithShape="1">
-          <a:blip r:embed="rId5"/>
-          <a:srcRect t="13475"/>
-          <a:stretch/>
-        </p:blipFill>
-        <p:spPr>
-          <a:xfrm>
-            <a:off x="6533248" y="1318054"/>
-            <a:ext cx="5067300" cy="1664774"/>
-          </a:xfrm>
-          <a:prstGeom prst="rect">
-            <a:avLst/>
-          </a:prstGeom>
-        </p:spPr>
-      </p:pic>
-      <p:sp>
-        <p:nvSpPr>
-          <p:cNvPr id="8" name="TextBox 7"/>
-          <p:cNvSpPr txBox="1"/>
-          <p:nvPr/>
-        </p:nvSpPr>
-        <p:spPr>
-          <a:xfrm>
-            <a:off x="332900" y="5709272"/>
-            <a:ext cx="5733535" cy="1200329"/>
-          </a:xfrm>
-          <a:prstGeom prst="rect">
-            <a:avLst/>
-          </a:prstGeom>
-          <a:noFill/>
-        </p:spPr>
-        <p:txBody>
-          <a:bodyPr wrap="square" rtlCol="0">
-            <a:spAutoFit/>
-          </a:bodyPr>
-          <a:lstStyle/>
-          <a:p>
-            <a:r>
-              <a:rPr lang="en-US" dirty="0">
-                <a:hlinkClick r:id="rId6"/>
-              </a:rPr>
-              <a:t>https://cran.r-project.org/web/packages/data.table/vignettes/datatable-intro.html</a:t>
-            </a:r>
-            <a:r>
-              <a:rPr lang="en-US" dirty="0"/>
-              <a:t> </a:t>
-            </a:r>
-          </a:p>
-          <a:p>
-            <a:endParaRPr lang="en-US" dirty="0"/>
-          </a:p>
-        </p:txBody>
-      </p:sp>
-    </p:spTree>
-    <p:extLst>
-      <p:ext uri="{BB962C8B-B14F-4D97-AF65-F5344CB8AC3E}">
-        <p14:creationId xmlns:p14="http://schemas.microsoft.com/office/powerpoint/2010/main" val="336395568"/>
-      </p:ext>
-    </p:extLst>
-  </p:cSld>
-  <p:clrMapOvr>
-    <a:masterClrMapping/>
-  </p:clrMapOvr>
 </p:sld>
 </file>
 
@@ -18675,6 +17917,1787 @@
 </file>
 
 <file path=ppt/slides/slide30.xml><?xml version="1.0" encoding="utf-8"?>
+<p:sld xmlns:a="http://schemas.openxmlformats.org/drawingml/2006/main" xmlns:r="http://schemas.openxmlformats.org/officeDocument/2006/relationships" xmlns:p="http://schemas.openxmlformats.org/presentationml/2006/main">
+  <p:cSld>
+    <p:spTree>
+      <p:nvGrpSpPr>
+        <p:cNvPr id="1" name=""/>
+        <p:cNvGrpSpPr/>
+        <p:nvPr/>
+      </p:nvGrpSpPr>
+      <p:grpSpPr>
+        <a:xfrm>
+          <a:off x="0" y="0"/>
+          <a:ext cx="0" cy="0"/>
+          <a:chOff x="0" y="0"/>
+          <a:chExt cx="0" cy="0"/>
+        </a:xfrm>
+      </p:grpSpPr>
+      <p:sp>
+        <p:nvSpPr>
+          <p:cNvPr id="7" name="Text Placeholder 6"/>
+          <p:cNvSpPr>
+            <a:spLocks noGrp="1"/>
+          </p:cNvSpPr>
+          <p:nvPr>
+            <p:ph type="body" sz="quarter" idx="14"/>
+          </p:nvPr>
+        </p:nvSpPr>
+        <p:spPr>
+          <a:xfrm>
+            <a:off x="542620" y="1226357"/>
+            <a:ext cx="4900386" cy="334508"/>
+          </a:xfrm>
+        </p:spPr>
+        <p:txBody>
+          <a:bodyPr/>
+          <a:lstStyle/>
+          <a:p>
+            <a:r>
+              <a:rPr lang="en-US" dirty="0"/>
+              <a:t>minimal </a:t>
+            </a:r>
+            <a:r>
+              <a:rPr lang="en-US" dirty="0" smtClean="0"/>
+              <a:t>example 1</a:t>
+            </a:r>
+            <a:endParaRPr lang="en-US" dirty="0"/>
+          </a:p>
+        </p:txBody>
+      </p:sp>
+      <p:sp>
+        <p:nvSpPr>
+          <p:cNvPr id="10" name="Text Placeholder 9"/>
+          <p:cNvSpPr>
+            <a:spLocks noGrp="1"/>
+          </p:cNvSpPr>
+          <p:nvPr>
+            <p:ph type="body" sz="quarter" idx="18"/>
+          </p:nvPr>
+        </p:nvSpPr>
+        <p:spPr>
+          <a:xfrm>
+            <a:off x="6533248" y="5574061"/>
+            <a:ext cx="4900386" cy="883020"/>
+          </a:xfrm>
+        </p:spPr>
+        <p:txBody>
+          <a:bodyPr/>
+          <a:lstStyle/>
+          <a:p>
+            <a:r>
+              <a:rPr lang="en-US" dirty="0"/>
+              <a:t>More complex </a:t>
+            </a:r>
+            <a:r>
+              <a:rPr lang="en-US" dirty="0" smtClean="0"/>
+              <a:t>example/ </a:t>
+            </a:r>
+            <a:r>
+              <a:rPr lang="en-US" dirty="0"/>
+              <a:t>demo of other functionalities</a:t>
+            </a:r>
+            <a:r>
+              <a:rPr lang="en-US" dirty="0" smtClean="0"/>
+              <a:t>:</a:t>
+            </a:r>
+            <a:endParaRPr lang="en-US" dirty="0"/>
+          </a:p>
+          <a:p>
+            <a:r>
+              <a:rPr lang="en-US" dirty="0">
+                <a:hlinkClick r:id="rId3"/>
+              </a:rPr>
+              <a:t>https://gallery.shinyapps.io/012-datatables/</a:t>
+            </a:r>
+            <a:r>
+              <a:rPr lang="en-US" dirty="0"/>
+              <a:t> </a:t>
+            </a:r>
+          </a:p>
+        </p:txBody>
+      </p:sp>
+      <p:sp>
+        <p:nvSpPr>
+          <p:cNvPr id="3" name="Title 2"/>
+          <p:cNvSpPr>
+            <a:spLocks noGrp="1"/>
+          </p:cNvSpPr>
+          <p:nvPr>
+            <p:ph type="title"/>
+          </p:nvPr>
+        </p:nvSpPr>
+        <p:spPr/>
+        <p:txBody>
+          <a:bodyPr/>
+          <a:lstStyle/>
+          <a:p>
+            <a:r>
+              <a:rPr lang="en-US" dirty="0" err="1" smtClean="0"/>
+              <a:t>DataTables</a:t>
+            </a:r>
+            <a:endParaRPr lang="en-US" dirty="0"/>
+          </a:p>
+        </p:txBody>
+      </p:sp>
+      <p:sp>
+        <p:nvSpPr>
+          <p:cNvPr id="5" name="Rectangle 1"/>
+          <p:cNvSpPr>
+            <a:spLocks noGrp="1" noChangeArrowheads="1"/>
+          </p:cNvSpPr>
+          <p:nvPr>
+            <p:ph idx="4294967295"/>
+          </p:nvPr>
+        </p:nvSpPr>
+        <p:spPr bwMode="auto">
+          <a:xfrm>
+            <a:off x="608522" y="1696076"/>
+            <a:ext cx="4991100" cy="3877985"/>
+          </a:xfrm>
+          <a:prstGeom prst="rect">
+            <a:avLst/>
+          </a:prstGeom>
+          <a:solidFill>
+            <a:schemeClr val="bg1"/>
+          </a:solidFill>
+          <a:ln>
+            <a:noFill/>
+          </a:ln>
+          <a:effectLst/>
+          <a:extLst/>
+        </p:spPr>
+        <p:txBody>
+          <a:bodyPr vert="horz" wrap="square" lIns="0" tIns="0" rIns="0" bIns="0" numCol="1" anchor="ctr" anchorCtr="0" compatLnSpc="1">
+            <a:prstTxWarp prst="textNoShape">
+              <a:avLst/>
+            </a:prstTxWarp>
+            <a:spAutoFit/>
+          </a:bodyPr>
+          <a:lstStyle/>
+          <a:p>
+            <a:pPr marL="0" marR="0" lvl="0" indent="0" algn="l" defTabSz="914400" rtl="0" eaLnBrk="0" fontAlgn="base" latinLnBrk="0" hangingPunct="0">
+              <a:lnSpc>
+                <a:spcPct val="100000"/>
+              </a:lnSpc>
+              <a:spcBef>
+                <a:spcPct val="0"/>
+              </a:spcBef>
+              <a:spcAft>
+                <a:spcPct val="0"/>
+              </a:spcAft>
+              <a:buClrTx/>
+              <a:buSzTx/>
+              <a:buFontTx/>
+              <a:buNone/>
+              <a:tabLst/>
+            </a:pPr>
+            <a:r>
+              <a:rPr kumimoji="0" lang="en-US" altLang="en-US" sz="1800" b="0" i="0" u="none" strike="noStrike" cap="none" normalizeH="0" baseline="0" dirty="0" smtClean="0">
+                <a:ln>
+                  <a:noFill/>
+                </a:ln>
+                <a:effectLst/>
+                <a:latin typeface="Arial" panose="020B0604020202020204" pitchFamily="34" charset="0"/>
+                <a:cs typeface="Arial" panose="020B0604020202020204" pitchFamily="34" charset="0"/>
+              </a:rPr>
+              <a:t>library(DT) </a:t>
+            </a:r>
+          </a:p>
+          <a:p>
+            <a:pPr marL="0" marR="0" lvl="0" indent="0" algn="l" defTabSz="914400" rtl="0" eaLnBrk="0" fontAlgn="base" latinLnBrk="0" hangingPunct="0">
+              <a:lnSpc>
+                <a:spcPct val="100000"/>
+              </a:lnSpc>
+              <a:spcBef>
+                <a:spcPct val="0"/>
+              </a:spcBef>
+              <a:spcAft>
+                <a:spcPct val="0"/>
+              </a:spcAft>
+              <a:buClrTx/>
+              <a:buSzTx/>
+              <a:buFontTx/>
+              <a:buNone/>
+              <a:tabLst/>
+            </a:pPr>
+            <a:endParaRPr kumimoji="0" lang="en-US" altLang="en-US" sz="1800" b="0" i="0" u="none" strike="noStrike" cap="none" normalizeH="0" baseline="0" dirty="0" smtClean="0">
+              <a:ln>
+                <a:noFill/>
+              </a:ln>
+              <a:effectLst/>
+              <a:latin typeface="Arial" panose="020B0604020202020204" pitchFamily="34" charset="0"/>
+              <a:cs typeface="Arial" panose="020B0604020202020204" pitchFamily="34" charset="0"/>
+            </a:endParaRPr>
+          </a:p>
+          <a:p>
+            <a:pPr marL="0" marR="0" lvl="0" indent="0" algn="l" defTabSz="914400" rtl="0" eaLnBrk="0" fontAlgn="base" latinLnBrk="0" hangingPunct="0">
+              <a:lnSpc>
+                <a:spcPct val="100000"/>
+              </a:lnSpc>
+              <a:spcBef>
+                <a:spcPct val="0"/>
+              </a:spcBef>
+              <a:spcAft>
+                <a:spcPct val="0"/>
+              </a:spcAft>
+              <a:buClrTx/>
+              <a:buSzTx/>
+              <a:buFontTx/>
+              <a:buNone/>
+              <a:tabLst/>
+            </a:pPr>
+            <a:r>
+              <a:rPr kumimoji="0" lang="en-US" altLang="en-US" sz="1800" b="0" i="0" u="none" strike="noStrike" cap="none" normalizeH="0" baseline="0" dirty="0" err="1" smtClean="0">
+                <a:ln>
+                  <a:noFill/>
+                </a:ln>
+                <a:effectLst/>
+                <a:latin typeface="Arial" panose="020B0604020202020204" pitchFamily="34" charset="0"/>
+                <a:cs typeface="Arial" panose="020B0604020202020204" pitchFamily="34" charset="0"/>
+              </a:rPr>
+              <a:t>ui</a:t>
+            </a:r>
+            <a:r>
+              <a:rPr kumimoji="0" lang="en-US" altLang="en-US" sz="1800" b="0" i="0" u="none" strike="noStrike" cap="none" normalizeH="0" baseline="0" dirty="0" smtClean="0">
+                <a:ln>
+                  <a:noFill/>
+                </a:ln>
+                <a:effectLst/>
+                <a:latin typeface="Arial" panose="020B0604020202020204" pitchFamily="34" charset="0"/>
+                <a:cs typeface="Arial" panose="020B0604020202020204" pitchFamily="34" charset="0"/>
+              </a:rPr>
+              <a:t> &lt;- </a:t>
+            </a:r>
+            <a:r>
+              <a:rPr kumimoji="0" lang="en-US" altLang="en-US" sz="1800" b="0" i="0" u="none" strike="noStrike" cap="none" normalizeH="0" baseline="0" dirty="0" err="1" smtClean="0">
+                <a:ln>
+                  <a:noFill/>
+                </a:ln>
+                <a:effectLst/>
+                <a:latin typeface="Arial" panose="020B0604020202020204" pitchFamily="34" charset="0"/>
+                <a:cs typeface="Arial" panose="020B0604020202020204" pitchFamily="34" charset="0"/>
+              </a:rPr>
+              <a:t>fluidPage</a:t>
+            </a:r>
+            <a:r>
+              <a:rPr kumimoji="0" lang="en-US" altLang="en-US" sz="1800" b="0" i="0" u="none" strike="noStrike" cap="none" normalizeH="0" baseline="0" dirty="0" smtClean="0">
+                <a:ln>
+                  <a:noFill/>
+                </a:ln>
+                <a:effectLst/>
+                <a:latin typeface="Arial" panose="020B0604020202020204" pitchFamily="34" charset="0"/>
+                <a:cs typeface="Arial" panose="020B0604020202020204" pitchFamily="34" charset="0"/>
+              </a:rPr>
+              <a:t>( </a:t>
+            </a:r>
+          </a:p>
+          <a:p>
+            <a:pPr marL="0" marR="0" lvl="0" indent="0" algn="l" defTabSz="914400" rtl="0" eaLnBrk="0" fontAlgn="base" latinLnBrk="0" hangingPunct="0">
+              <a:lnSpc>
+                <a:spcPct val="100000"/>
+              </a:lnSpc>
+              <a:spcBef>
+                <a:spcPct val="0"/>
+              </a:spcBef>
+              <a:spcAft>
+                <a:spcPct val="0"/>
+              </a:spcAft>
+              <a:buClrTx/>
+              <a:buSzTx/>
+              <a:buFontTx/>
+              <a:buNone/>
+              <a:tabLst/>
+            </a:pPr>
+            <a:r>
+              <a:rPr lang="en-US" altLang="en-US" sz="1800" dirty="0" smtClean="0">
+                <a:latin typeface="Arial" panose="020B0604020202020204" pitchFamily="34" charset="0"/>
+                <a:cs typeface="Arial" panose="020B0604020202020204" pitchFamily="34" charset="0"/>
+              </a:rPr>
+              <a:t>     </a:t>
+            </a:r>
+            <a:r>
+              <a:rPr kumimoji="0" lang="en-US" altLang="en-US" sz="1800" b="0" i="0" u="none" strike="noStrike" cap="none" normalizeH="0" baseline="0" dirty="0" smtClean="0">
+                <a:ln>
+                  <a:noFill/>
+                </a:ln>
+                <a:effectLst/>
+                <a:latin typeface="Arial" panose="020B0604020202020204" pitchFamily="34" charset="0"/>
+                <a:cs typeface="Arial" panose="020B0604020202020204" pitchFamily="34" charset="0"/>
+              </a:rPr>
+              <a:t>h2("The </a:t>
+            </a:r>
+            <a:r>
+              <a:rPr kumimoji="0" lang="en-US" altLang="en-US" sz="1800" b="0" i="0" u="none" strike="noStrike" cap="none" normalizeH="0" baseline="0" dirty="0" err="1" smtClean="0">
+                <a:ln>
+                  <a:noFill/>
+                </a:ln>
+                <a:effectLst/>
+                <a:latin typeface="Arial" panose="020B0604020202020204" pitchFamily="34" charset="0"/>
+                <a:cs typeface="Arial" panose="020B0604020202020204" pitchFamily="34" charset="0"/>
+              </a:rPr>
+              <a:t>mtcars</a:t>
+            </a:r>
+            <a:r>
+              <a:rPr kumimoji="0" lang="en-US" altLang="en-US" sz="1800" b="0" i="0" u="none" strike="noStrike" cap="none" normalizeH="0" baseline="0" dirty="0" smtClean="0">
+                <a:ln>
+                  <a:noFill/>
+                </a:ln>
+                <a:effectLst/>
+                <a:latin typeface="Arial" panose="020B0604020202020204" pitchFamily="34" charset="0"/>
+                <a:cs typeface="Arial" panose="020B0604020202020204" pitchFamily="34" charset="0"/>
+              </a:rPr>
+              <a:t> data"), </a:t>
+            </a:r>
+          </a:p>
+          <a:p>
+            <a:pPr marL="0" marR="0" lvl="0" indent="0" algn="l" defTabSz="914400" rtl="0" eaLnBrk="0" fontAlgn="base" latinLnBrk="0" hangingPunct="0">
+              <a:lnSpc>
+                <a:spcPct val="100000"/>
+              </a:lnSpc>
+              <a:spcBef>
+                <a:spcPct val="0"/>
+              </a:spcBef>
+              <a:spcAft>
+                <a:spcPct val="0"/>
+              </a:spcAft>
+              <a:buClrTx/>
+              <a:buSzTx/>
+              <a:buFontTx/>
+              <a:buNone/>
+              <a:tabLst/>
+            </a:pPr>
+            <a:r>
+              <a:rPr lang="en-US" altLang="en-US" sz="1800" dirty="0">
+                <a:latin typeface="Arial" panose="020B0604020202020204" pitchFamily="34" charset="0"/>
+                <a:cs typeface="Arial" panose="020B0604020202020204" pitchFamily="34" charset="0"/>
+              </a:rPr>
+              <a:t> </a:t>
+            </a:r>
+            <a:r>
+              <a:rPr lang="en-US" altLang="en-US" sz="1800" dirty="0" smtClean="0">
+                <a:latin typeface="Arial" panose="020B0604020202020204" pitchFamily="34" charset="0"/>
+                <a:cs typeface="Arial" panose="020B0604020202020204" pitchFamily="34" charset="0"/>
+              </a:rPr>
+              <a:t>    </a:t>
+            </a:r>
+            <a:r>
+              <a:rPr kumimoji="0" lang="en-US" altLang="en-US" sz="1800" b="0" i="0" u="none" strike="noStrike" cap="none" normalizeH="0" baseline="0" dirty="0" smtClean="0">
+                <a:ln>
+                  <a:noFill/>
+                </a:ln>
+                <a:effectLst/>
+                <a:latin typeface="Arial" panose="020B0604020202020204" pitchFamily="34" charset="0"/>
+                <a:cs typeface="Arial" panose="020B0604020202020204" pitchFamily="34" charset="0"/>
+              </a:rPr>
+              <a:t>DT::</a:t>
+            </a:r>
+            <a:r>
+              <a:rPr kumimoji="0" lang="en-US" altLang="en-US" sz="1800" b="0" i="0" u="none" strike="noStrike" cap="none" normalizeH="0" baseline="0" dirty="0" err="1" smtClean="0">
+                <a:ln>
+                  <a:noFill/>
+                </a:ln>
+                <a:effectLst/>
+                <a:latin typeface="Arial" panose="020B0604020202020204" pitchFamily="34" charset="0"/>
+                <a:cs typeface="Arial" panose="020B0604020202020204" pitchFamily="34" charset="0"/>
+              </a:rPr>
+              <a:t>dataTableOutput</a:t>
+            </a:r>
+            <a:r>
+              <a:rPr kumimoji="0" lang="en-US" altLang="en-US" sz="1800" b="0" i="0" u="none" strike="noStrike" cap="none" normalizeH="0" baseline="0" dirty="0" smtClean="0">
+                <a:ln>
+                  <a:noFill/>
+                </a:ln>
+                <a:effectLst/>
+                <a:latin typeface="Arial" panose="020B0604020202020204" pitchFamily="34" charset="0"/>
+                <a:cs typeface="Arial" panose="020B0604020202020204" pitchFamily="34" charset="0"/>
+              </a:rPr>
+              <a:t>("</a:t>
+            </a:r>
+            <a:r>
+              <a:rPr kumimoji="0" lang="en-US" altLang="en-US" sz="1800" b="0" i="0" u="none" strike="noStrike" cap="none" normalizeH="0" baseline="0" dirty="0" err="1" smtClean="0">
+                <a:ln>
+                  <a:noFill/>
+                </a:ln>
+                <a:effectLst/>
+                <a:latin typeface="Arial" panose="020B0604020202020204" pitchFamily="34" charset="0"/>
+                <a:cs typeface="Arial" panose="020B0604020202020204" pitchFamily="34" charset="0"/>
+              </a:rPr>
+              <a:t>mytable</a:t>
+            </a:r>
+            <a:r>
+              <a:rPr kumimoji="0" lang="en-US" altLang="en-US" sz="1800" b="0" i="0" u="none" strike="noStrike" cap="none" normalizeH="0" baseline="0" dirty="0" smtClean="0">
+                <a:ln>
+                  <a:noFill/>
+                </a:ln>
+                <a:effectLst/>
+                <a:latin typeface="Arial" panose="020B0604020202020204" pitchFamily="34" charset="0"/>
+                <a:cs typeface="Arial" panose="020B0604020202020204" pitchFamily="34" charset="0"/>
+              </a:rPr>
+              <a:t>")</a:t>
+            </a:r>
+          </a:p>
+          <a:p>
+            <a:pPr marL="0" marR="0" lvl="0" indent="0" algn="l" defTabSz="914400" rtl="0" eaLnBrk="0" fontAlgn="base" latinLnBrk="0" hangingPunct="0">
+              <a:lnSpc>
+                <a:spcPct val="100000"/>
+              </a:lnSpc>
+              <a:spcBef>
+                <a:spcPct val="0"/>
+              </a:spcBef>
+              <a:spcAft>
+                <a:spcPct val="0"/>
+              </a:spcAft>
+              <a:buClrTx/>
+              <a:buSzTx/>
+              <a:buFontTx/>
+              <a:buNone/>
+              <a:tabLst/>
+            </a:pPr>
+            <a:r>
+              <a:rPr kumimoji="0" lang="en-US" altLang="en-US" sz="1800" b="0" i="0" u="none" strike="noStrike" cap="none" normalizeH="0" baseline="0" dirty="0" smtClean="0">
+                <a:ln>
+                  <a:noFill/>
+                </a:ln>
+                <a:effectLst/>
+                <a:latin typeface="Arial" panose="020B0604020202020204" pitchFamily="34" charset="0"/>
+                <a:cs typeface="Arial" panose="020B0604020202020204" pitchFamily="34" charset="0"/>
+              </a:rPr>
+              <a:t> )</a:t>
+            </a:r>
+          </a:p>
+          <a:p>
+            <a:pPr marL="0" marR="0" lvl="0" indent="0" algn="l" defTabSz="914400" rtl="0" eaLnBrk="0" fontAlgn="base" latinLnBrk="0" hangingPunct="0">
+              <a:lnSpc>
+                <a:spcPct val="100000"/>
+              </a:lnSpc>
+              <a:spcBef>
+                <a:spcPct val="0"/>
+              </a:spcBef>
+              <a:spcAft>
+                <a:spcPct val="0"/>
+              </a:spcAft>
+              <a:buClrTx/>
+              <a:buSzTx/>
+              <a:buFontTx/>
+              <a:buNone/>
+              <a:tabLst/>
+            </a:pPr>
+            <a:endParaRPr lang="en-US" altLang="en-US" sz="1800" dirty="0">
+              <a:latin typeface="Arial" panose="020B0604020202020204" pitchFamily="34" charset="0"/>
+              <a:cs typeface="Arial" panose="020B0604020202020204" pitchFamily="34" charset="0"/>
+            </a:endParaRPr>
+          </a:p>
+          <a:p>
+            <a:pPr marL="0" marR="0" lvl="0" indent="0" algn="l" defTabSz="914400" rtl="0" eaLnBrk="0" fontAlgn="base" latinLnBrk="0" hangingPunct="0">
+              <a:lnSpc>
+                <a:spcPct val="100000"/>
+              </a:lnSpc>
+              <a:spcBef>
+                <a:spcPct val="0"/>
+              </a:spcBef>
+              <a:spcAft>
+                <a:spcPct val="0"/>
+              </a:spcAft>
+              <a:buClrTx/>
+              <a:buSzTx/>
+              <a:buFontTx/>
+              <a:buNone/>
+              <a:tabLst/>
+            </a:pPr>
+            <a:r>
+              <a:rPr kumimoji="0" lang="en-US" altLang="en-US" sz="1800" b="0" i="0" u="none" strike="noStrike" cap="none" normalizeH="0" baseline="0" dirty="0" smtClean="0">
+                <a:ln>
+                  <a:noFill/>
+                </a:ln>
+                <a:effectLst/>
+                <a:latin typeface="Arial" panose="020B0604020202020204" pitchFamily="34" charset="0"/>
+                <a:cs typeface="Arial" panose="020B0604020202020204" pitchFamily="34" charset="0"/>
+              </a:rPr>
+              <a:t> server &lt;- function(input, output) { </a:t>
+            </a:r>
+          </a:p>
+          <a:p>
+            <a:pPr marL="0" marR="0" lvl="0" indent="0" algn="l" defTabSz="914400" rtl="0" eaLnBrk="0" fontAlgn="base" latinLnBrk="0" hangingPunct="0">
+              <a:lnSpc>
+                <a:spcPct val="100000"/>
+              </a:lnSpc>
+              <a:spcBef>
+                <a:spcPct val="0"/>
+              </a:spcBef>
+              <a:spcAft>
+                <a:spcPct val="0"/>
+              </a:spcAft>
+              <a:buClrTx/>
+              <a:buSzTx/>
+              <a:buFontTx/>
+              <a:buNone/>
+              <a:tabLst/>
+            </a:pPr>
+            <a:r>
+              <a:rPr lang="en-US" altLang="en-US" sz="1800" dirty="0">
+                <a:latin typeface="Arial" panose="020B0604020202020204" pitchFamily="34" charset="0"/>
+                <a:cs typeface="Arial" panose="020B0604020202020204" pitchFamily="34" charset="0"/>
+              </a:rPr>
+              <a:t> </a:t>
+            </a:r>
+            <a:r>
+              <a:rPr lang="en-US" altLang="en-US" sz="1800" dirty="0" smtClean="0">
+                <a:latin typeface="Arial" panose="020B0604020202020204" pitchFamily="34" charset="0"/>
+                <a:cs typeface="Arial" panose="020B0604020202020204" pitchFamily="34" charset="0"/>
+              </a:rPr>
+              <a:t>   </a:t>
+            </a:r>
+            <a:r>
+              <a:rPr kumimoji="0" lang="en-US" altLang="en-US" sz="1800" b="0" i="0" u="none" strike="noStrike" cap="none" normalizeH="0" baseline="0" dirty="0" err="1" smtClean="0">
+                <a:ln>
+                  <a:noFill/>
+                </a:ln>
+                <a:effectLst/>
+                <a:latin typeface="Arial" panose="020B0604020202020204" pitchFamily="34" charset="0"/>
+                <a:cs typeface="Arial" panose="020B0604020202020204" pitchFamily="34" charset="0"/>
+              </a:rPr>
+              <a:t>output$mytable</a:t>
+            </a:r>
+            <a:r>
+              <a:rPr kumimoji="0" lang="en-US" altLang="en-US" sz="1800" b="0" i="0" u="none" strike="noStrike" cap="none" normalizeH="0" baseline="0" dirty="0" smtClean="0">
+                <a:ln>
+                  <a:noFill/>
+                </a:ln>
+                <a:effectLst/>
+                <a:latin typeface="Arial" panose="020B0604020202020204" pitchFamily="34" charset="0"/>
+                <a:cs typeface="Arial" panose="020B0604020202020204" pitchFamily="34" charset="0"/>
+              </a:rPr>
+              <a:t> </a:t>
+            </a:r>
+            <a:r>
+              <a:rPr lang="en-US" altLang="en-US" sz="1800" dirty="0" smtClean="0">
+                <a:latin typeface="Arial" panose="020B0604020202020204" pitchFamily="34" charset="0"/>
+                <a:cs typeface="Arial" panose="020B0604020202020204" pitchFamily="34" charset="0"/>
+              </a:rPr>
+              <a:t>&lt;-</a:t>
+            </a:r>
+            <a:r>
+              <a:rPr kumimoji="0" lang="en-US" altLang="en-US" sz="1800" b="0" i="0" u="none" strike="noStrike" cap="none" normalizeH="0" baseline="0" dirty="0" smtClean="0">
+                <a:ln>
+                  <a:noFill/>
+                </a:ln>
+                <a:effectLst/>
+                <a:latin typeface="Arial" panose="020B0604020202020204" pitchFamily="34" charset="0"/>
+                <a:cs typeface="Arial" panose="020B0604020202020204" pitchFamily="34" charset="0"/>
+              </a:rPr>
+              <a:t> DT::</a:t>
+            </a:r>
+            <a:r>
+              <a:rPr kumimoji="0" lang="en-US" altLang="en-US" sz="1800" b="0" i="0" u="none" strike="noStrike" cap="none" normalizeH="0" baseline="0" dirty="0" err="1" smtClean="0">
+                <a:ln>
+                  <a:noFill/>
+                </a:ln>
+                <a:effectLst/>
+                <a:latin typeface="Arial" panose="020B0604020202020204" pitchFamily="34" charset="0"/>
+                <a:cs typeface="Arial" panose="020B0604020202020204" pitchFamily="34" charset="0"/>
+              </a:rPr>
+              <a:t>renderDataTable</a:t>
+            </a:r>
+            <a:r>
+              <a:rPr kumimoji="0" lang="en-US" altLang="en-US" sz="1800" b="0" i="0" u="none" strike="noStrike" cap="none" normalizeH="0" baseline="0" dirty="0" smtClean="0">
+                <a:ln>
+                  <a:noFill/>
+                </a:ln>
+                <a:effectLst/>
+                <a:latin typeface="Arial" panose="020B0604020202020204" pitchFamily="34" charset="0"/>
+                <a:cs typeface="Arial" panose="020B0604020202020204" pitchFamily="34" charset="0"/>
+              </a:rPr>
+              <a:t>({</a:t>
+            </a:r>
+          </a:p>
+          <a:p>
+            <a:pPr marL="0" marR="0" lvl="0" indent="0" algn="l" defTabSz="914400" rtl="0" eaLnBrk="0" fontAlgn="base" latinLnBrk="0" hangingPunct="0">
+              <a:lnSpc>
+                <a:spcPct val="100000"/>
+              </a:lnSpc>
+              <a:spcBef>
+                <a:spcPct val="0"/>
+              </a:spcBef>
+              <a:spcAft>
+                <a:spcPct val="0"/>
+              </a:spcAft>
+              <a:buClrTx/>
+              <a:buSzTx/>
+              <a:buFontTx/>
+              <a:buNone/>
+              <a:tabLst/>
+            </a:pPr>
+            <a:r>
+              <a:rPr kumimoji="0" lang="en-US" altLang="en-US" sz="1800" b="0" i="0" u="none" strike="noStrike" cap="none" normalizeH="0" baseline="0" dirty="0" err="1" smtClean="0">
+                <a:ln>
+                  <a:noFill/>
+                </a:ln>
+                <a:effectLst/>
+                <a:latin typeface="Arial" panose="020B0604020202020204" pitchFamily="34" charset="0"/>
+                <a:cs typeface="Arial" panose="020B0604020202020204" pitchFamily="34" charset="0"/>
+              </a:rPr>
+              <a:t>mtcars</a:t>
+            </a:r>
+            <a:r>
+              <a:rPr kumimoji="0" lang="en-US" altLang="en-US" sz="1800" b="0" i="0" u="none" strike="noStrike" cap="none" normalizeH="0" baseline="0" dirty="0" smtClean="0">
+                <a:ln>
+                  <a:noFill/>
+                </a:ln>
+                <a:effectLst/>
+                <a:latin typeface="Arial" panose="020B0604020202020204" pitchFamily="34" charset="0"/>
+                <a:cs typeface="Arial" panose="020B0604020202020204" pitchFamily="34" charset="0"/>
+              </a:rPr>
+              <a:t> </a:t>
+            </a:r>
+          </a:p>
+          <a:p>
+            <a:pPr marL="0" marR="0" lvl="0" indent="0" algn="l" defTabSz="914400" rtl="0" eaLnBrk="0" fontAlgn="base" latinLnBrk="0" hangingPunct="0">
+              <a:lnSpc>
+                <a:spcPct val="100000"/>
+              </a:lnSpc>
+              <a:spcBef>
+                <a:spcPct val="0"/>
+              </a:spcBef>
+              <a:spcAft>
+                <a:spcPct val="0"/>
+              </a:spcAft>
+              <a:buClrTx/>
+              <a:buSzTx/>
+              <a:buFontTx/>
+              <a:buNone/>
+              <a:tabLst/>
+            </a:pPr>
+            <a:r>
+              <a:rPr lang="en-US" altLang="en-US" sz="1800" dirty="0">
+                <a:latin typeface="Arial" panose="020B0604020202020204" pitchFamily="34" charset="0"/>
+                <a:cs typeface="Arial" panose="020B0604020202020204" pitchFamily="34" charset="0"/>
+              </a:rPr>
+              <a:t> </a:t>
+            </a:r>
+            <a:r>
+              <a:rPr lang="en-US" altLang="en-US" sz="1800" dirty="0" smtClean="0">
+                <a:latin typeface="Arial" panose="020B0604020202020204" pitchFamily="34" charset="0"/>
+                <a:cs typeface="Arial" panose="020B0604020202020204" pitchFamily="34" charset="0"/>
+              </a:rPr>
+              <a:t> </a:t>
+            </a:r>
+            <a:r>
+              <a:rPr kumimoji="0" lang="en-US" altLang="en-US" sz="1800" b="0" i="0" u="none" strike="noStrike" cap="none" normalizeH="0" baseline="0" dirty="0" smtClean="0">
+                <a:ln>
+                  <a:noFill/>
+                </a:ln>
+                <a:effectLst/>
+                <a:latin typeface="Arial" panose="020B0604020202020204" pitchFamily="34" charset="0"/>
+                <a:cs typeface="Arial" panose="020B0604020202020204" pitchFamily="34" charset="0"/>
+              </a:rPr>
+              <a:t>})</a:t>
+            </a:r>
+          </a:p>
+          <a:p>
+            <a:pPr marL="0" marR="0" lvl="0" indent="0" algn="l" defTabSz="914400" rtl="0" eaLnBrk="0" fontAlgn="base" latinLnBrk="0" hangingPunct="0">
+              <a:lnSpc>
+                <a:spcPct val="100000"/>
+              </a:lnSpc>
+              <a:spcBef>
+                <a:spcPct val="0"/>
+              </a:spcBef>
+              <a:spcAft>
+                <a:spcPct val="0"/>
+              </a:spcAft>
+              <a:buClrTx/>
+              <a:buSzTx/>
+              <a:buFontTx/>
+              <a:buNone/>
+              <a:tabLst/>
+            </a:pPr>
+            <a:r>
+              <a:rPr kumimoji="0" lang="en-US" altLang="en-US" sz="1800" b="0" i="0" u="none" strike="noStrike" cap="none" normalizeH="0" baseline="0" dirty="0" smtClean="0">
+                <a:ln>
+                  <a:noFill/>
+                </a:ln>
+                <a:effectLst/>
+                <a:latin typeface="Arial" panose="020B0604020202020204" pitchFamily="34" charset="0"/>
+                <a:cs typeface="Arial" panose="020B0604020202020204" pitchFamily="34" charset="0"/>
+              </a:rPr>
+              <a:t> }</a:t>
+            </a:r>
+          </a:p>
+          <a:p>
+            <a:pPr marL="0" marR="0" lvl="0" indent="0" algn="l" defTabSz="914400" rtl="0" eaLnBrk="0" fontAlgn="base" latinLnBrk="0" hangingPunct="0">
+              <a:lnSpc>
+                <a:spcPct val="100000"/>
+              </a:lnSpc>
+              <a:spcBef>
+                <a:spcPct val="0"/>
+              </a:spcBef>
+              <a:spcAft>
+                <a:spcPct val="0"/>
+              </a:spcAft>
+              <a:buClrTx/>
+              <a:buSzTx/>
+              <a:buFontTx/>
+              <a:buNone/>
+              <a:tabLst/>
+            </a:pPr>
+            <a:endParaRPr lang="en-US" altLang="en-US" sz="1800" dirty="0">
+              <a:latin typeface="Arial" panose="020B0604020202020204" pitchFamily="34" charset="0"/>
+              <a:cs typeface="Arial" panose="020B0604020202020204" pitchFamily="34" charset="0"/>
+            </a:endParaRPr>
+          </a:p>
+          <a:p>
+            <a:pPr marL="0" marR="0" lvl="0" indent="0" algn="l" defTabSz="914400" rtl="0" eaLnBrk="0" fontAlgn="base" latinLnBrk="0" hangingPunct="0">
+              <a:lnSpc>
+                <a:spcPct val="100000"/>
+              </a:lnSpc>
+              <a:spcBef>
+                <a:spcPct val="0"/>
+              </a:spcBef>
+              <a:spcAft>
+                <a:spcPct val="0"/>
+              </a:spcAft>
+              <a:buClrTx/>
+              <a:buSzTx/>
+              <a:buFontTx/>
+              <a:buNone/>
+              <a:tabLst/>
+            </a:pPr>
+            <a:r>
+              <a:rPr kumimoji="0" lang="en-US" altLang="en-US" sz="1800" b="0" i="0" u="none" strike="noStrike" cap="none" normalizeH="0" baseline="0" dirty="0" smtClean="0">
+                <a:ln>
+                  <a:noFill/>
+                </a:ln>
+                <a:effectLst/>
+                <a:latin typeface="Arial" panose="020B0604020202020204" pitchFamily="34" charset="0"/>
+                <a:cs typeface="Arial" panose="020B0604020202020204" pitchFamily="34" charset="0"/>
+              </a:rPr>
+              <a:t> </a:t>
+            </a:r>
+            <a:r>
+              <a:rPr kumimoji="0" lang="en-US" altLang="en-US" sz="1800" b="0" i="0" u="none" strike="noStrike" cap="none" normalizeH="0" baseline="0" dirty="0" err="1" smtClean="0">
+                <a:ln>
+                  <a:noFill/>
+                </a:ln>
+                <a:effectLst/>
+                <a:latin typeface="Arial" panose="020B0604020202020204" pitchFamily="34" charset="0"/>
+                <a:cs typeface="Arial" panose="020B0604020202020204" pitchFamily="34" charset="0"/>
+              </a:rPr>
+              <a:t>shinyApp</a:t>
+            </a:r>
+            <a:r>
+              <a:rPr kumimoji="0" lang="en-US" altLang="en-US" sz="1800" b="0" i="0" u="none" strike="noStrike" cap="none" normalizeH="0" baseline="0" dirty="0" smtClean="0">
+                <a:ln>
+                  <a:noFill/>
+                </a:ln>
+                <a:effectLst/>
+                <a:latin typeface="Arial" panose="020B0604020202020204" pitchFamily="34" charset="0"/>
+                <a:cs typeface="Arial" panose="020B0604020202020204" pitchFamily="34" charset="0"/>
+              </a:rPr>
+              <a:t>(</a:t>
+            </a:r>
+            <a:r>
+              <a:rPr kumimoji="0" lang="en-US" altLang="en-US" sz="1800" b="0" i="0" u="none" strike="noStrike" cap="none" normalizeH="0" baseline="0" dirty="0" err="1" smtClean="0">
+                <a:ln>
+                  <a:noFill/>
+                </a:ln>
+                <a:effectLst/>
+                <a:latin typeface="Arial" panose="020B0604020202020204" pitchFamily="34" charset="0"/>
+                <a:cs typeface="Arial" panose="020B0604020202020204" pitchFamily="34" charset="0"/>
+              </a:rPr>
+              <a:t>ui</a:t>
+            </a:r>
+            <a:r>
+              <a:rPr kumimoji="0" lang="en-US" altLang="en-US" sz="1800" b="0" i="0" u="none" strike="noStrike" cap="none" normalizeH="0" baseline="0" dirty="0" smtClean="0">
+                <a:ln>
+                  <a:noFill/>
+                </a:ln>
+                <a:effectLst/>
+                <a:latin typeface="Arial" panose="020B0604020202020204" pitchFamily="34" charset="0"/>
+                <a:cs typeface="Arial" panose="020B0604020202020204" pitchFamily="34" charset="0"/>
+              </a:rPr>
+              <a:t>, server) </a:t>
+            </a:r>
+          </a:p>
+        </p:txBody>
+      </p:sp>
+      <p:pic>
+        <p:nvPicPr>
+          <p:cNvPr id="4" name="Picture 3"/>
+          <p:cNvPicPr>
+            <a:picLocks noChangeAspect="1"/>
+          </p:cNvPicPr>
+          <p:nvPr/>
+        </p:nvPicPr>
+        <p:blipFill>
+          <a:blip r:embed="rId4"/>
+          <a:stretch>
+            <a:fillRect/>
+          </a:stretch>
+        </p:blipFill>
+        <p:spPr>
+          <a:xfrm>
+            <a:off x="7090460" y="3077802"/>
+            <a:ext cx="3952875" cy="2257425"/>
+          </a:xfrm>
+          <a:prstGeom prst="rect">
+            <a:avLst/>
+          </a:prstGeom>
+        </p:spPr>
+      </p:pic>
+      <p:pic>
+        <p:nvPicPr>
+          <p:cNvPr id="6" name="Picture 5"/>
+          <p:cNvPicPr>
+            <a:picLocks noChangeAspect="1"/>
+          </p:cNvPicPr>
+          <p:nvPr/>
+        </p:nvPicPr>
+        <p:blipFill rotWithShape="1">
+          <a:blip r:embed="rId5"/>
+          <a:srcRect t="13475"/>
+          <a:stretch/>
+        </p:blipFill>
+        <p:spPr>
+          <a:xfrm>
+            <a:off x="6533248" y="1318054"/>
+            <a:ext cx="5067300" cy="1664774"/>
+          </a:xfrm>
+          <a:prstGeom prst="rect">
+            <a:avLst/>
+          </a:prstGeom>
+        </p:spPr>
+      </p:pic>
+      <p:sp>
+        <p:nvSpPr>
+          <p:cNvPr id="8" name="TextBox 7"/>
+          <p:cNvSpPr txBox="1"/>
+          <p:nvPr/>
+        </p:nvSpPr>
+        <p:spPr>
+          <a:xfrm>
+            <a:off x="332900" y="5709272"/>
+            <a:ext cx="5733535" cy="1200329"/>
+          </a:xfrm>
+          <a:prstGeom prst="rect">
+            <a:avLst/>
+          </a:prstGeom>
+          <a:noFill/>
+        </p:spPr>
+        <p:txBody>
+          <a:bodyPr wrap="square" rtlCol="0">
+            <a:spAutoFit/>
+          </a:bodyPr>
+          <a:lstStyle/>
+          <a:p>
+            <a:r>
+              <a:rPr lang="en-US" dirty="0">
+                <a:hlinkClick r:id="rId6"/>
+              </a:rPr>
+              <a:t>https://cran.r-project.org/web/packages/data.table/vignettes/datatable-intro.html</a:t>
+            </a:r>
+            <a:r>
+              <a:rPr lang="en-US" dirty="0"/>
+              <a:t> </a:t>
+            </a:r>
+          </a:p>
+          <a:p>
+            <a:endParaRPr lang="en-US" dirty="0"/>
+          </a:p>
+        </p:txBody>
+      </p:sp>
+    </p:spTree>
+    <p:extLst>
+      <p:ext uri="{BB962C8B-B14F-4D97-AF65-F5344CB8AC3E}">
+        <p14:creationId xmlns:p14="http://schemas.microsoft.com/office/powerpoint/2010/main" val="336395568"/>
+      </p:ext>
+    </p:extLst>
+  </p:cSld>
+  <p:clrMapOvr>
+    <a:masterClrMapping/>
+  </p:clrMapOvr>
+</p:sld>
+</file>
+
+<file path=ppt/slides/slide31.xml><?xml version="1.0" encoding="utf-8"?>
+<p:sld xmlns:a="http://schemas.openxmlformats.org/drawingml/2006/main" xmlns:r="http://schemas.openxmlformats.org/officeDocument/2006/relationships" xmlns:p="http://schemas.openxmlformats.org/presentationml/2006/main">
+  <p:cSld>
+    <p:spTree>
+      <p:nvGrpSpPr>
+        <p:cNvPr id="1" name=""/>
+        <p:cNvGrpSpPr/>
+        <p:nvPr/>
+      </p:nvGrpSpPr>
+      <p:grpSpPr>
+        <a:xfrm>
+          <a:off x="0" y="0"/>
+          <a:ext cx="0" cy="0"/>
+          <a:chOff x="0" y="0"/>
+          <a:chExt cx="0" cy="0"/>
+        </a:xfrm>
+      </p:grpSpPr>
+      <p:sp>
+        <p:nvSpPr>
+          <p:cNvPr id="2" name="Title 1"/>
+          <p:cNvSpPr>
+            <a:spLocks noGrp="1"/>
+          </p:cNvSpPr>
+          <p:nvPr>
+            <p:ph type="title"/>
+          </p:nvPr>
+        </p:nvSpPr>
+        <p:spPr/>
+        <p:txBody>
+          <a:bodyPr/>
+          <a:lstStyle/>
+          <a:p>
+            <a:r>
+              <a:rPr lang="en-US" dirty="0" smtClean="0"/>
+              <a:t>Reactive filtering and </a:t>
+            </a:r>
+            <a:r>
+              <a:rPr lang="en-US" dirty="0" err="1" smtClean="0"/>
+              <a:t>renderUI</a:t>
+            </a:r>
+            <a:endParaRPr lang="en-US" dirty="0"/>
+          </a:p>
+        </p:txBody>
+      </p:sp>
+      <p:sp>
+        <p:nvSpPr>
+          <p:cNvPr id="3" name="Content Placeholder 2"/>
+          <p:cNvSpPr>
+            <a:spLocks noGrp="1"/>
+          </p:cNvSpPr>
+          <p:nvPr>
+            <p:ph idx="1"/>
+          </p:nvPr>
+        </p:nvSpPr>
+        <p:spPr/>
+        <p:txBody>
+          <a:bodyPr/>
+          <a:lstStyle/>
+          <a:p>
+            <a:endParaRPr lang="en-US"/>
+          </a:p>
+        </p:txBody>
+      </p:sp>
+    </p:spTree>
+    <p:extLst>
+      <p:ext uri="{BB962C8B-B14F-4D97-AF65-F5344CB8AC3E}">
+        <p14:creationId xmlns:p14="http://schemas.microsoft.com/office/powerpoint/2010/main" val="747180590"/>
+      </p:ext>
+    </p:extLst>
+  </p:cSld>
+  <p:clrMapOvr>
+    <a:masterClrMapping/>
+  </p:clrMapOvr>
+</p:sld>
+</file>
+
+<file path=ppt/slides/slide32.xml><?xml version="1.0" encoding="utf-8"?>
+<p:sld xmlns:a="http://schemas.openxmlformats.org/drawingml/2006/main" xmlns:r="http://schemas.openxmlformats.org/officeDocument/2006/relationships" xmlns:p="http://schemas.openxmlformats.org/presentationml/2006/main">
+  <p:cSld>
+    <p:spTree>
+      <p:nvGrpSpPr>
+        <p:cNvPr id="1" name=""/>
+        <p:cNvGrpSpPr/>
+        <p:nvPr/>
+      </p:nvGrpSpPr>
+      <p:grpSpPr>
+        <a:xfrm>
+          <a:off x="0" y="0"/>
+          <a:ext cx="0" cy="0"/>
+          <a:chOff x="0" y="0"/>
+          <a:chExt cx="0" cy="0"/>
+        </a:xfrm>
+      </p:grpSpPr>
+      <p:sp>
+        <p:nvSpPr>
+          <p:cNvPr id="3" name="Title 2"/>
+          <p:cNvSpPr>
+            <a:spLocks noGrp="1"/>
+          </p:cNvSpPr>
+          <p:nvPr>
+            <p:ph type="title"/>
+          </p:nvPr>
+        </p:nvSpPr>
+        <p:spPr/>
+        <p:txBody>
+          <a:bodyPr/>
+          <a:lstStyle/>
+          <a:p>
+            <a:r>
+              <a:rPr lang="en-US" dirty="0" err="1" smtClean="0"/>
+              <a:t>ConditionalPanels</a:t>
+            </a:r>
+            <a:endParaRPr lang="en-US" dirty="0"/>
+          </a:p>
+        </p:txBody>
+      </p:sp>
+      <p:sp>
+        <p:nvSpPr>
+          <p:cNvPr id="4" name="Content Placeholder 3"/>
+          <p:cNvSpPr>
+            <a:spLocks noGrp="1"/>
+          </p:cNvSpPr>
+          <p:nvPr>
+            <p:ph idx="1"/>
+          </p:nvPr>
+        </p:nvSpPr>
+        <p:spPr/>
+        <p:txBody>
+          <a:bodyPr/>
+          <a:lstStyle/>
+          <a:p>
+            <a:endParaRPr lang="en-US"/>
+          </a:p>
+        </p:txBody>
+      </p:sp>
+    </p:spTree>
+    <p:extLst>
+      <p:ext uri="{BB962C8B-B14F-4D97-AF65-F5344CB8AC3E}">
+        <p14:creationId xmlns:p14="http://schemas.microsoft.com/office/powerpoint/2010/main" val="3145896824"/>
+      </p:ext>
+    </p:extLst>
+  </p:cSld>
+  <p:clrMapOvr>
+    <a:masterClrMapping/>
+  </p:clrMapOvr>
+</p:sld>
+</file>
+
+<file path=ppt/slides/slide33.xml><?xml version="1.0" encoding="utf-8"?>
+<p:sld xmlns:a="http://schemas.openxmlformats.org/drawingml/2006/main" xmlns:r="http://schemas.openxmlformats.org/officeDocument/2006/relationships" xmlns:p="http://schemas.openxmlformats.org/presentationml/2006/main">
+  <p:cSld>
+    <p:spTree>
+      <p:nvGrpSpPr>
+        <p:cNvPr id="1" name=""/>
+        <p:cNvGrpSpPr/>
+        <p:nvPr/>
+      </p:nvGrpSpPr>
+      <p:grpSpPr>
+        <a:xfrm>
+          <a:off x="0" y="0"/>
+          <a:ext cx="0" cy="0"/>
+          <a:chOff x="0" y="0"/>
+          <a:chExt cx="0" cy="0"/>
+        </a:xfrm>
+      </p:grpSpPr>
+      <p:sp>
+        <p:nvSpPr>
+          <p:cNvPr id="2" name="Title 1"/>
+          <p:cNvSpPr>
+            <a:spLocks noGrp="1"/>
+          </p:cNvSpPr>
+          <p:nvPr>
+            <p:ph type="title"/>
+          </p:nvPr>
+        </p:nvSpPr>
+        <p:spPr/>
+        <p:txBody>
+          <a:bodyPr/>
+          <a:lstStyle/>
+          <a:p>
+            <a:r>
+              <a:rPr lang="en-US" dirty="0" smtClean="0"/>
+              <a:t>Google analytics</a:t>
+            </a:r>
+            <a:endParaRPr lang="en-US" dirty="0"/>
+          </a:p>
+        </p:txBody>
+      </p:sp>
+      <p:sp>
+        <p:nvSpPr>
+          <p:cNvPr id="3" name="Content Placeholder 2"/>
+          <p:cNvSpPr>
+            <a:spLocks noGrp="1"/>
+          </p:cNvSpPr>
+          <p:nvPr>
+            <p:ph idx="1"/>
+          </p:nvPr>
+        </p:nvSpPr>
+        <p:spPr/>
+        <p:txBody>
+          <a:bodyPr/>
+          <a:lstStyle/>
+          <a:p>
+            <a:r>
+              <a:rPr lang="en-US" dirty="0"/>
+              <a:t>Google Analytics is a free service offered by Google that collects information about who visits you website and what they do while they are there. </a:t>
+            </a:r>
+            <a:endParaRPr lang="en-US" dirty="0" smtClean="0"/>
+          </a:p>
+          <a:p>
+            <a:r>
+              <a:rPr lang="en-US" dirty="0" smtClean="0"/>
+              <a:t>You </a:t>
+            </a:r>
+            <a:r>
+              <a:rPr lang="en-US" dirty="0"/>
+              <a:t>can learn more about Google Analytics at </a:t>
+            </a:r>
+            <a:r>
+              <a:rPr lang="en-US" dirty="0" smtClean="0">
+                <a:hlinkClick r:id="rId2" action="ppaction://hlinkfile"/>
+              </a:rPr>
+              <a:t>support.google.com/analytics</a:t>
+            </a:r>
+            <a:r>
+              <a:rPr lang="en-US" dirty="0" smtClean="0"/>
+              <a:t>, </a:t>
+            </a:r>
+            <a:r>
+              <a:rPr lang="en-US" dirty="0"/>
+              <a:t>which explains how to set up and use Google Analytics with a web page</a:t>
+            </a:r>
+            <a:r>
+              <a:rPr lang="en-US" dirty="0" smtClean="0"/>
+              <a:t>.</a:t>
+            </a:r>
+          </a:p>
+          <a:p>
+            <a:r>
+              <a:rPr lang="en-US" dirty="0" smtClean="0">
+                <a:hlinkClick r:id="rId3"/>
+              </a:rPr>
+              <a:t>Informatics Analytics</a:t>
+            </a:r>
+            <a:endParaRPr lang="en-US" dirty="0"/>
+          </a:p>
+          <a:p>
+            <a:endParaRPr lang="en-US" dirty="0"/>
+          </a:p>
+        </p:txBody>
+      </p:sp>
+    </p:spTree>
+    <p:extLst>
+      <p:ext uri="{BB962C8B-B14F-4D97-AF65-F5344CB8AC3E}">
+        <p14:creationId xmlns:p14="http://schemas.microsoft.com/office/powerpoint/2010/main" val="4698145"/>
+      </p:ext>
+    </p:extLst>
+  </p:cSld>
+  <p:clrMapOvr>
+    <a:masterClrMapping/>
+  </p:clrMapOvr>
+</p:sld>
+</file>
+
+<file path=ppt/slides/slide34.xml><?xml version="1.0" encoding="utf-8"?>
+<p:sld xmlns:a="http://schemas.openxmlformats.org/drawingml/2006/main" xmlns:r="http://schemas.openxmlformats.org/officeDocument/2006/relationships" xmlns:p="http://schemas.openxmlformats.org/presentationml/2006/main">
+  <p:cSld>
+    <p:spTree>
+      <p:nvGrpSpPr>
+        <p:cNvPr id="1" name=""/>
+        <p:cNvGrpSpPr/>
+        <p:nvPr/>
+      </p:nvGrpSpPr>
+      <p:grpSpPr>
+        <a:xfrm>
+          <a:off x="0" y="0"/>
+          <a:ext cx="0" cy="0"/>
+          <a:chOff x="0" y="0"/>
+          <a:chExt cx="0" cy="0"/>
+        </a:xfrm>
+      </p:grpSpPr>
+      <p:sp>
+        <p:nvSpPr>
+          <p:cNvPr id="3" name="Content Placeholder 2"/>
+          <p:cNvSpPr>
+            <a:spLocks noGrp="1"/>
+          </p:cNvSpPr>
+          <p:nvPr>
+            <p:ph idx="1"/>
+          </p:nvPr>
+        </p:nvSpPr>
+        <p:spPr>
+          <a:xfrm>
+            <a:off x="446316" y="310243"/>
+            <a:ext cx="6852556" cy="5922895"/>
+          </a:xfrm>
+        </p:spPr>
+        <p:txBody>
+          <a:bodyPr/>
+          <a:lstStyle/>
+          <a:p>
+            <a:endParaRPr lang="en-US" dirty="0"/>
+          </a:p>
+          <a:p>
+            <a:pPr marL="342900" indent="-342900">
+              <a:buFont typeface="+mj-lt"/>
+              <a:buAutoNum type="arabicPeriod"/>
+            </a:pPr>
+            <a:r>
+              <a:rPr lang="en-US" dirty="0"/>
+              <a:t>Step 1 - Create an account</a:t>
+            </a:r>
+          </a:p>
+          <a:p>
+            <a:pPr lvl="1"/>
+            <a:r>
+              <a:rPr lang="en-US" dirty="0"/>
+              <a:t>To use Google Analytics, you must open a free account at </a:t>
+            </a:r>
+            <a:r>
+              <a:rPr lang="en-US" dirty="0">
+                <a:hlinkClick r:id="rId2"/>
+              </a:rPr>
+              <a:t>www.google.com/analytics</a:t>
+            </a:r>
+            <a:r>
+              <a:rPr lang="en-US" dirty="0" smtClean="0">
+                <a:hlinkClick r:id="rId2"/>
+              </a:rPr>
+              <a:t>/</a:t>
+            </a:r>
+            <a:r>
+              <a:rPr lang="en-US" dirty="0" smtClean="0"/>
+              <a:t> .</a:t>
+            </a:r>
+            <a:endParaRPr lang="en-US" dirty="0"/>
+          </a:p>
+          <a:p>
+            <a:pPr marL="342900" indent="-342900">
+              <a:buFont typeface="+mj-lt"/>
+              <a:buAutoNum type="arabicPeriod"/>
+            </a:pPr>
+            <a:r>
+              <a:rPr lang="en-US" dirty="0"/>
+              <a:t>Step 2 - Add a property</a:t>
+            </a:r>
+          </a:p>
+          <a:p>
+            <a:pPr lvl="1"/>
+            <a:r>
+              <a:rPr lang="en-US" dirty="0"/>
+              <a:t>Next, you must register your Shiny app as a </a:t>
+            </a:r>
+            <a:r>
+              <a:rPr lang="en-US" i="1" dirty="0"/>
+              <a:t>property</a:t>
+            </a:r>
+            <a:r>
+              <a:rPr lang="en-US" dirty="0"/>
+              <a:t> in your Google Analytics account. You can do this on the sign up page, </a:t>
+            </a:r>
+            <a:r>
+              <a:rPr lang="en-US" dirty="0" smtClean="0"/>
+              <a:t>or - if </a:t>
+            </a:r>
+            <a:r>
+              <a:rPr lang="en-US" dirty="0"/>
+              <a:t>you already have a Google Analytics </a:t>
+            </a:r>
+            <a:r>
+              <a:rPr lang="en-US" dirty="0" smtClean="0"/>
+              <a:t>account-you </a:t>
+            </a:r>
+            <a:r>
+              <a:rPr lang="en-US" dirty="0"/>
+              <a:t>can do this in the Admin </a:t>
+            </a:r>
+            <a:r>
+              <a:rPr lang="en-US" dirty="0" smtClean="0"/>
+              <a:t>tab.</a:t>
+            </a:r>
+          </a:p>
+          <a:p>
+            <a:pPr lvl="1"/>
+            <a:r>
+              <a:rPr lang="en-US" dirty="0" smtClean="0"/>
+              <a:t>Once </a:t>
+            </a:r>
+            <a:r>
+              <a:rPr lang="en-US" dirty="0"/>
+              <a:t>you have entered the necessary information, click “Get Tracking ID” at the bottom of the form. Google Analytics will open a new window that contains a tracking ID number for your app as well as a short JavaScript script</a:t>
+            </a:r>
+            <a:r>
+              <a:rPr lang="en-US" dirty="0" smtClean="0"/>
+              <a:t>.</a:t>
+            </a:r>
+          </a:p>
+          <a:p>
+            <a:pPr marL="342900" indent="-342900">
+              <a:buFont typeface="+mj-lt"/>
+              <a:buAutoNum type="arabicPeriod"/>
+            </a:pPr>
+            <a:r>
+              <a:rPr lang="en-US" dirty="0"/>
+              <a:t>Step 3 - Embed tracking </a:t>
+            </a:r>
+            <a:r>
+              <a:rPr lang="en-US" dirty="0" smtClean="0"/>
+              <a:t>script</a:t>
+            </a:r>
+          </a:p>
+          <a:p>
+            <a:pPr lvl="1"/>
+            <a:r>
+              <a:rPr lang="en-US" dirty="0"/>
+              <a:t>If you built your Shiny app with a </a:t>
+            </a:r>
+            <a:r>
+              <a:rPr lang="en-US" dirty="0" err="1"/>
+              <a:t>ui.R</a:t>
+            </a:r>
+            <a:r>
+              <a:rPr lang="en-US" dirty="0"/>
+              <a:t> file (the traditional method), use the </a:t>
+            </a:r>
+            <a:r>
+              <a:rPr lang="en-US" dirty="0" err="1"/>
+              <a:t>tags$head</a:t>
+            </a:r>
+            <a:r>
+              <a:rPr lang="en-US" dirty="0"/>
+              <a:t> and </a:t>
+            </a:r>
+            <a:r>
+              <a:rPr lang="en-US" dirty="0" err="1"/>
+              <a:t>includeScript</a:t>
+            </a:r>
+            <a:r>
+              <a:rPr lang="en-US" dirty="0"/>
+              <a:t> functions to include the script.</a:t>
+            </a:r>
+          </a:p>
+        </p:txBody>
+      </p:sp>
+      <p:pic>
+        <p:nvPicPr>
+          <p:cNvPr id="6" name="Picture 2" descr="https://shiny.rstudio.com/images/GA-property2.png"/>
+          <p:cNvPicPr>
+            <a:picLocks noChangeAspect="1" noChangeArrowheads="1"/>
+          </p:cNvPicPr>
+          <p:nvPr/>
+        </p:nvPicPr>
+        <p:blipFill>
+          <a:blip r:embed="rId3">
+            <a:extLst>
+              <a:ext uri="{28A0092B-C50C-407E-A947-70E740481C1C}">
+                <a14:useLocalDpi xmlns:a14="http://schemas.microsoft.com/office/drawing/2010/main" val="0"/>
+              </a:ext>
+            </a:extLst>
+          </a:blip>
+          <a:srcRect/>
+          <a:stretch>
+            <a:fillRect/>
+          </a:stretch>
+        </p:blipFill>
+        <p:spPr bwMode="auto">
+          <a:xfrm>
+            <a:off x="7466070" y="1159329"/>
+            <a:ext cx="5235408" cy="1910217"/>
+          </a:xfrm>
+          <a:prstGeom prst="rect">
+            <a:avLst/>
+          </a:prstGeom>
+          <a:noFill/>
+          <a:extLst>
+            <a:ext uri="{909E8E84-426E-40DD-AFC4-6F175D3DCCD1}">
+              <a14:hiddenFill xmlns:a14="http://schemas.microsoft.com/office/drawing/2010/main">
+                <a:solidFill>
+                  <a:srgbClr val="FFFFFF"/>
+                </a:solidFill>
+              </a14:hiddenFill>
+            </a:ext>
+          </a:extLst>
+        </p:spPr>
+      </p:pic>
+      <p:pic>
+        <p:nvPicPr>
+          <p:cNvPr id="5" name="Picture 4"/>
+          <p:cNvPicPr>
+            <a:picLocks noChangeAspect="1"/>
+          </p:cNvPicPr>
+          <p:nvPr/>
+        </p:nvPicPr>
+        <p:blipFill>
+          <a:blip r:embed="rId4">
+            <a:extLst>
+              <a:ext uri="{28A0092B-C50C-407E-A947-70E740481C1C}">
+                <a14:useLocalDpi xmlns:a14="http://schemas.microsoft.com/office/drawing/2010/main" val="0"/>
+              </a:ext>
+            </a:extLst>
+          </a:blip>
+          <a:stretch>
+            <a:fillRect/>
+          </a:stretch>
+        </p:blipFill>
+        <p:spPr>
+          <a:xfrm>
+            <a:off x="7466070" y="3271690"/>
+            <a:ext cx="4649748" cy="3196904"/>
+          </a:xfrm>
+          <a:prstGeom prst="rect">
+            <a:avLst/>
+          </a:prstGeom>
+        </p:spPr>
+      </p:pic>
+    </p:spTree>
+    <p:extLst>
+      <p:ext uri="{BB962C8B-B14F-4D97-AF65-F5344CB8AC3E}">
+        <p14:creationId xmlns:p14="http://schemas.microsoft.com/office/powerpoint/2010/main" val="2676728724"/>
+      </p:ext>
+    </p:extLst>
+  </p:cSld>
+  <p:clrMapOvr>
+    <a:masterClrMapping/>
+  </p:clrMapOvr>
+</p:sld>
+</file>
+
+<file path=ppt/slides/slide35.xml><?xml version="1.0" encoding="utf-8"?>
+<p:sld xmlns:a="http://schemas.openxmlformats.org/drawingml/2006/main" xmlns:r="http://schemas.openxmlformats.org/officeDocument/2006/relationships" xmlns:p="http://schemas.openxmlformats.org/presentationml/2006/main">
+  <p:cSld>
+    <p:spTree>
+      <p:nvGrpSpPr>
+        <p:cNvPr id="1" name=""/>
+        <p:cNvGrpSpPr/>
+        <p:nvPr/>
+      </p:nvGrpSpPr>
+      <p:grpSpPr>
+        <a:xfrm>
+          <a:off x="0" y="0"/>
+          <a:ext cx="0" cy="0"/>
+          <a:chOff x="0" y="0"/>
+          <a:chExt cx="0" cy="0"/>
+        </a:xfrm>
+      </p:grpSpPr>
+      <p:sp>
+        <p:nvSpPr>
+          <p:cNvPr id="2" name="Title 1"/>
+          <p:cNvSpPr>
+            <a:spLocks noGrp="1"/>
+          </p:cNvSpPr>
+          <p:nvPr>
+            <p:ph type="title"/>
+          </p:nvPr>
+        </p:nvSpPr>
+        <p:spPr/>
+        <p:txBody>
+          <a:bodyPr/>
+          <a:lstStyle/>
+          <a:p>
+            <a:r>
+              <a:rPr lang="en-US" dirty="0" smtClean="0"/>
+              <a:t>Shiny – Online tutorials</a:t>
+            </a:r>
+            <a:endParaRPr lang="en-US" dirty="0"/>
+          </a:p>
+        </p:txBody>
+      </p:sp>
+      <p:sp>
+        <p:nvSpPr>
+          <p:cNvPr id="3" name="Content Placeholder 2"/>
+          <p:cNvSpPr>
+            <a:spLocks noGrp="1"/>
+          </p:cNvSpPr>
+          <p:nvPr>
+            <p:ph idx="1"/>
+          </p:nvPr>
+        </p:nvSpPr>
+        <p:spPr/>
+        <p:txBody>
+          <a:bodyPr/>
+          <a:lstStyle/>
+          <a:p>
+            <a:r>
+              <a:rPr lang="en-US" dirty="0">
+                <a:hlinkClick r:id="rId2"/>
+              </a:rPr>
+              <a:t>https://shiny.rstudio.com/tutorial</a:t>
+            </a:r>
+            <a:r>
+              <a:rPr lang="en-US" dirty="0" smtClean="0">
+                <a:hlinkClick r:id="rId2"/>
+              </a:rPr>
+              <a:t>/</a:t>
+            </a:r>
+            <a:endParaRPr lang="en-US" dirty="0" smtClean="0"/>
+          </a:p>
+          <a:p>
+            <a:endParaRPr lang="en-US" dirty="0"/>
+          </a:p>
+        </p:txBody>
+      </p:sp>
+      <p:pic>
+        <p:nvPicPr>
+          <p:cNvPr id="4" name="Picture 3"/>
+          <p:cNvPicPr>
+            <a:picLocks noChangeAspect="1"/>
+          </p:cNvPicPr>
+          <p:nvPr/>
+        </p:nvPicPr>
+        <p:blipFill>
+          <a:blip r:embed="rId3">
+            <a:extLst>
+              <a:ext uri="{28A0092B-C50C-407E-A947-70E740481C1C}">
+                <a14:useLocalDpi xmlns:a14="http://schemas.microsoft.com/office/drawing/2010/main" val="0"/>
+              </a:ext>
+            </a:extLst>
+          </a:blip>
+          <a:stretch>
+            <a:fillRect/>
+          </a:stretch>
+        </p:blipFill>
+        <p:spPr>
+          <a:xfrm>
+            <a:off x="1061635" y="2080650"/>
+            <a:ext cx="8283842" cy="3891867"/>
+          </a:xfrm>
+          <a:prstGeom prst="rect">
+            <a:avLst/>
+          </a:prstGeom>
+        </p:spPr>
+      </p:pic>
+    </p:spTree>
+    <p:extLst>
+      <p:ext uri="{BB962C8B-B14F-4D97-AF65-F5344CB8AC3E}">
+        <p14:creationId xmlns:p14="http://schemas.microsoft.com/office/powerpoint/2010/main" val="3790858460"/>
+      </p:ext>
+    </p:extLst>
+  </p:cSld>
+  <p:clrMapOvr>
+    <a:masterClrMapping/>
+  </p:clrMapOvr>
+</p:sld>
+</file>
+
+<file path=ppt/slides/slide36.xml><?xml version="1.0" encoding="utf-8"?>
+<p:sld xmlns:a="http://schemas.openxmlformats.org/drawingml/2006/main" xmlns:r="http://schemas.openxmlformats.org/officeDocument/2006/relationships" xmlns:p="http://schemas.openxmlformats.org/presentationml/2006/main">
+  <p:cSld>
+    <p:spTree>
+      <p:nvGrpSpPr>
+        <p:cNvPr id="1" name=""/>
+        <p:cNvGrpSpPr/>
+        <p:nvPr/>
+      </p:nvGrpSpPr>
+      <p:grpSpPr>
+        <a:xfrm>
+          <a:off x="0" y="0"/>
+          <a:ext cx="0" cy="0"/>
+          <a:chOff x="0" y="0"/>
+          <a:chExt cx="0" cy="0"/>
+        </a:xfrm>
+      </p:grpSpPr>
+      <p:sp>
+        <p:nvSpPr>
+          <p:cNvPr id="2" name="Title 1"/>
+          <p:cNvSpPr>
+            <a:spLocks noGrp="1"/>
+          </p:cNvSpPr>
+          <p:nvPr>
+            <p:ph type="title"/>
+          </p:nvPr>
+        </p:nvSpPr>
+        <p:spPr/>
+        <p:txBody>
+          <a:bodyPr/>
+          <a:lstStyle/>
+          <a:p>
+            <a:r>
+              <a:rPr lang="en-US" dirty="0" smtClean="0"/>
+              <a:t>Other Resources</a:t>
+            </a:r>
+            <a:endParaRPr lang="en-US" dirty="0"/>
+          </a:p>
+        </p:txBody>
+      </p:sp>
+      <p:sp>
+        <p:nvSpPr>
+          <p:cNvPr id="3" name="Content Placeholder 2"/>
+          <p:cNvSpPr>
+            <a:spLocks noGrp="1"/>
+          </p:cNvSpPr>
+          <p:nvPr>
+            <p:ph idx="1"/>
+          </p:nvPr>
+        </p:nvSpPr>
+        <p:spPr/>
+        <p:txBody>
+          <a:bodyPr/>
+          <a:lstStyle/>
+          <a:p>
+            <a:r>
+              <a:rPr lang="en-US" dirty="0">
+                <a:hlinkClick r:id="rId2"/>
+              </a:rPr>
+              <a:t>https://www.rstudio.com/products/shiny/shiny-user-showcase</a:t>
+            </a:r>
+            <a:r>
+              <a:rPr lang="en-US" dirty="0" smtClean="0">
+                <a:hlinkClick r:id="rId2"/>
+              </a:rPr>
+              <a:t>/</a:t>
+            </a:r>
+            <a:endParaRPr lang="en-US" dirty="0" smtClean="0"/>
+          </a:p>
+          <a:p>
+            <a:r>
+              <a:rPr lang="en-US" dirty="0">
+                <a:hlinkClick r:id="rId3"/>
+              </a:rPr>
+              <a:t>https://shiny.rstudio.com/gallery</a:t>
+            </a:r>
+            <a:r>
+              <a:rPr lang="en-US" dirty="0" smtClean="0">
+                <a:hlinkClick r:id="rId3"/>
+              </a:rPr>
+              <a:t>/</a:t>
+            </a:r>
+            <a:endParaRPr lang="en-US" dirty="0" smtClean="0"/>
+          </a:p>
+          <a:p>
+            <a:r>
+              <a:rPr lang="en-US" dirty="0">
+                <a:hlinkClick r:id="rId4"/>
+              </a:rPr>
+              <a:t>http://gallery.htmlwidgets.org</a:t>
+            </a:r>
+            <a:r>
+              <a:rPr lang="en-US" dirty="0" smtClean="0">
+                <a:hlinkClick r:id="rId4"/>
+              </a:rPr>
+              <a:t>/</a:t>
+            </a:r>
+            <a:endParaRPr lang="en-US" dirty="0" smtClean="0"/>
+          </a:p>
+          <a:p>
+            <a:r>
+              <a:rPr lang="en-US" dirty="0" smtClean="0">
+                <a:hlinkClick r:id="rId5"/>
+              </a:rPr>
+              <a:t>https</a:t>
+            </a:r>
+            <a:r>
+              <a:rPr lang="en-US" dirty="0">
+                <a:hlinkClick r:id="rId5"/>
+              </a:rPr>
+              <a:t>://www.r-graph-gallery.com</a:t>
+            </a:r>
+            <a:r>
+              <a:rPr lang="en-US" dirty="0" smtClean="0">
+                <a:hlinkClick r:id="rId5"/>
+              </a:rPr>
+              <a:t>/</a:t>
+            </a:r>
+            <a:endParaRPr lang="en-US" dirty="0" smtClean="0"/>
+          </a:p>
+          <a:p>
+            <a:r>
+              <a:rPr lang="en-US" dirty="0">
+                <a:hlinkClick r:id="rId6"/>
+              </a:rPr>
+              <a:t>https://rmarkdown.rstudio.com/flexdashboard</a:t>
+            </a:r>
+            <a:r>
+              <a:rPr lang="en-US" dirty="0" smtClean="0">
+                <a:hlinkClick r:id="rId6"/>
+              </a:rPr>
+              <a:t>/</a:t>
+            </a:r>
+            <a:endParaRPr lang="en-US" dirty="0" smtClean="0"/>
+          </a:p>
+          <a:p>
+            <a:r>
+              <a:rPr lang="en-US" dirty="0">
+                <a:hlinkClick r:id="rId7"/>
+              </a:rPr>
+              <a:t>https://</a:t>
+            </a:r>
+            <a:r>
+              <a:rPr lang="en-US" dirty="0" smtClean="0">
+                <a:hlinkClick r:id="rId7"/>
+              </a:rPr>
+              <a:t>github.com/d3/d3/wiki/Gallery</a:t>
+            </a:r>
+            <a:endParaRPr lang="en-US" dirty="0" smtClean="0"/>
+          </a:p>
+          <a:p>
+            <a:r>
+              <a:rPr lang="en-US" dirty="0">
+                <a:hlinkClick r:id="rId8"/>
+              </a:rPr>
+              <a:t>http://myinspirationinformation.com/visualisation/d3-js/integrating-d3-js-into-r-shiny</a:t>
+            </a:r>
+            <a:r>
+              <a:rPr lang="en-US" dirty="0" smtClean="0">
+                <a:hlinkClick r:id="rId8"/>
+              </a:rPr>
+              <a:t>/</a:t>
+            </a:r>
+            <a:endParaRPr lang="en-US" dirty="0" smtClean="0"/>
+          </a:p>
+          <a:p>
+            <a:r>
+              <a:rPr lang="en-US" dirty="0">
+                <a:hlinkClick r:id="rId9"/>
+              </a:rPr>
+              <a:t>https://</a:t>
+            </a:r>
+            <a:r>
+              <a:rPr lang="en-US" dirty="0" smtClean="0">
+                <a:hlinkClick r:id="rId9"/>
+              </a:rPr>
+              <a:t>rstudio.github.io/promises/articles/shiny.html</a:t>
+            </a:r>
+            <a:endParaRPr lang="en-US" dirty="0" smtClean="0"/>
+          </a:p>
+          <a:p>
+            <a:r>
+              <a:rPr lang="en-US" dirty="0">
+                <a:hlinkClick r:id="rId10"/>
+              </a:rPr>
+              <a:t>http://spatial.ly</a:t>
+            </a:r>
+            <a:r>
+              <a:rPr lang="en-US" dirty="0" smtClean="0">
+                <a:hlinkClick r:id="rId10"/>
+              </a:rPr>
+              <a:t>/</a:t>
+            </a:r>
+            <a:r>
+              <a:rPr lang="en-US" dirty="0" smtClean="0"/>
+              <a:t> </a:t>
+            </a:r>
+          </a:p>
+          <a:p>
+            <a:r>
+              <a:rPr lang="en-US" dirty="0">
+                <a:hlinkClick r:id="rId11"/>
+              </a:rPr>
+              <a:t>https://flowingdata.com/category/tutorials</a:t>
+            </a:r>
+            <a:r>
+              <a:rPr lang="en-US" dirty="0" smtClean="0">
+                <a:hlinkClick r:id="rId11"/>
+              </a:rPr>
+              <a:t>/</a:t>
+            </a:r>
+            <a:r>
+              <a:rPr lang="en-US" dirty="0" smtClean="0"/>
+              <a:t> </a:t>
+            </a:r>
+          </a:p>
+          <a:p>
+            <a:endParaRPr lang="en-US" dirty="0"/>
+          </a:p>
+        </p:txBody>
+      </p:sp>
+    </p:spTree>
+    <p:extLst>
+      <p:ext uri="{BB962C8B-B14F-4D97-AF65-F5344CB8AC3E}">
+        <p14:creationId xmlns:p14="http://schemas.microsoft.com/office/powerpoint/2010/main" val="588268779"/>
+      </p:ext>
+    </p:extLst>
+  </p:cSld>
+  <p:clrMapOvr>
+    <a:masterClrMapping/>
+  </p:clrMapOvr>
+</p:sld>
+</file>
+
+<file path=ppt/slides/slide37.xml><?xml version="1.0" encoding="utf-8"?>
 <p:sld xmlns:a="http://schemas.openxmlformats.org/drawingml/2006/main" xmlns:r="http://schemas.openxmlformats.org/officeDocument/2006/relationships" xmlns:p="http://schemas.openxmlformats.org/presentationml/2006/main">
   <p:cSld>
     <p:spTree>
@@ -19134,152 +20157,6 @@
       </p:par>
     </p:tnLst>
   </p:timing>
-</p:sld>
-</file>
-
-<file path=ppt/slides/slide31.xml><?xml version="1.0" encoding="utf-8"?>
-<p:sld xmlns:a="http://schemas.openxmlformats.org/drawingml/2006/main" xmlns:r="http://schemas.openxmlformats.org/officeDocument/2006/relationships" xmlns:p="http://schemas.openxmlformats.org/presentationml/2006/main">
-  <p:cSld>
-    <p:spTree>
-      <p:nvGrpSpPr>
-        <p:cNvPr id="1" name=""/>
-        <p:cNvGrpSpPr/>
-        <p:nvPr/>
-      </p:nvGrpSpPr>
-      <p:grpSpPr>
-        <a:xfrm>
-          <a:off x="0" y="0"/>
-          <a:ext cx="0" cy="0"/>
-          <a:chOff x="0" y="0"/>
-          <a:chExt cx="0" cy="0"/>
-        </a:xfrm>
-      </p:grpSpPr>
-      <p:sp>
-        <p:nvSpPr>
-          <p:cNvPr id="2" name="Title 1"/>
-          <p:cNvSpPr>
-            <a:spLocks noGrp="1"/>
-          </p:cNvSpPr>
-          <p:nvPr>
-            <p:ph type="title"/>
-          </p:nvPr>
-        </p:nvSpPr>
-        <p:spPr/>
-        <p:txBody>
-          <a:bodyPr/>
-          <a:lstStyle/>
-          <a:p>
-            <a:r>
-              <a:rPr lang="en-US" dirty="0" smtClean="0"/>
-              <a:t>Session 3</a:t>
-            </a:r>
-            <a:endParaRPr lang="en-US" dirty="0"/>
-          </a:p>
-        </p:txBody>
-      </p:sp>
-      <p:sp>
-        <p:nvSpPr>
-          <p:cNvPr id="3" name="Content Placeholder 2"/>
-          <p:cNvSpPr>
-            <a:spLocks noGrp="1"/>
-          </p:cNvSpPr>
-          <p:nvPr>
-            <p:ph idx="1"/>
-          </p:nvPr>
-        </p:nvSpPr>
-        <p:spPr/>
-        <p:txBody>
-          <a:bodyPr/>
-          <a:lstStyle/>
-          <a:p>
-            <a:r>
-              <a:rPr lang="en-US" dirty="0" smtClean="0"/>
-              <a:t>Outline</a:t>
-            </a:r>
-          </a:p>
-          <a:p>
-            <a:pPr lvl="1"/>
-            <a:r>
-              <a:rPr lang="en-US" dirty="0" err="1" smtClean="0"/>
-              <a:t>renderUI</a:t>
-            </a:r>
-            <a:r>
-              <a:rPr lang="en-US" dirty="0" smtClean="0"/>
-              <a:t> function, </a:t>
-            </a:r>
-            <a:r>
-              <a:rPr lang="en-US" dirty="0" err="1" smtClean="0"/>
-              <a:t>conditionalPanels</a:t>
-            </a:r>
-            <a:r>
-              <a:rPr lang="en-US" dirty="0" smtClean="0"/>
-              <a:t>, Observers and reactive filtering</a:t>
-            </a:r>
-          </a:p>
-          <a:p>
-            <a:pPr lvl="1"/>
-            <a:r>
-              <a:rPr lang="en-US" dirty="0" smtClean="0"/>
-              <a:t>Reactive plotting/filtering – tagging app, code to allow you to chose your plot parameters</a:t>
-            </a:r>
-          </a:p>
-          <a:p>
-            <a:pPr lvl="1"/>
-            <a:r>
-              <a:rPr lang="en-US" dirty="0"/>
-              <a:t>T</a:t>
-            </a:r>
-            <a:r>
-              <a:rPr lang="en-US" dirty="0" smtClean="0"/>
-              <a:t>ips </a:t>
-            </a:r>
-            <a:r>
-              <a:rPr lang="en-US" dirty="0"/>
-              <a:t>and tricks</a:t>
-            </a:r>
-            <a:endParaRPr lang="en-US" dirty="0" smtClean="0"/>
-          </a:p>
-          <a:p>
-            <a:pPr lvl="2">
-              <a:buFontTx/>
-              <a:buChar char="-"/>
-            </a:pPr>
-            <a:r>
-              <a:rPr lang="en-US" dirty="0" smtClean="0"/>
-              <a:t>Additional resources </a:t>
-            </a:r>
-          </a:p>
-          <a:p>
-            <a:pPr lvl="1"/>
-            <a:r>
-              <a:rPr lang="en-US" dirty="0"/>
-              <a:t>App </a:t>
-            </a:r>
-            <a:r>
-              <a:rPr lang="en-US" dirty="0" smtClean="0"/>
-              <a:t>troubleshooting -BYOA</a:t>
-            </a:r>
-          </a:p>
-          <a:p>
-            <a:pPr lvl="1"/>
-            <a:endParaRPr lang="en-US" dirty="0" smtClean="0"/>
-          </a:p>
-          <a:p>
-            <a:pPr lvl="1"/>
-            <a:endParaRPr lang="en-US" dirty="0"/>
-          </a:p>
-        </p:txBody>
-      </p:sp>
-    </p:spTree>
-    <p:extLst>
-      <p:ext uri="{BB962C8B-B14F-4D97-AF65-F5344CB8AC3E}">
-        <p14:creationId xmlns:p14="http://schemas.microsoft.com/office/powerpoint/2010/main" val="1484368376"/>
-      </p:ext>
-    </p:extLst>
-  </p:cSld>
-  <p:clrMapOvr>
-    <a:masterClrMapping/>
-  </p:clrMapOvr>
 </p:sld>
 </file>
 

</xml_diff>